<commit_message>
added First Triangle class, fixed VK_MODE problem
</commit_message>
<xml_diff>
--- a/vulkan.pptx
+++ b/vulkan.pptx
@@ -12,6 +12,7 @@
     <p:sldId id="261" r:id="rId6"/>
     <p:sldId id="262" r:id="rId7"/>
     <p:sldId id="264" r:id="rId8"/>
+    <p:sldId id="265" r:id="rId9"/>
   </p:sldIdLst>
   <p:sldSz cx="12192000" cy="6858000"/>
   <p:notesSz cx="6858000" cy="9144000"/>
@@ -15185,6 +15186,546 @@
     <p:extLst>
       <p:ext uri="{BB962C8B-B14F-4D97-AF65-F5344CB8AC3E}">
         <p14:creationId xmlns:p14="http://schemas.microsoft.com/office/powerpoint/2010/main" val="1877049561"/>
+      </p:ext>
+    </p:extLst>
+  </p:cSld>
+  <p:clrMapOvr>
+    <a:masterClrMapping/>
+  </p:clrMapOvr>
+</p:sld>
+</file>
+
+<file path=ppt/slides/slide8.xml><?xml version="1.0" encoding="utf-8"?>
+<p:sld xmlns:a="http://schemas.openxmlformats.org/drawingml/2006/main" xmlns:r="http://schemas.openxmlformats.org/officeDocument/2006/relationships" xmlns:p="http://schemas.openxmlformats.org/presentationml/2006/main">
+  <p:cSld>
+    <p:spTree>
+      <p:nvGrpSpPr>
+        <p:cNvPr id="1" name=""/>
+        <p:cNvGrpSpPr/>
+        <p:nvPr/>
+      </p:nvGrpSpPr>
+      <p:grpSpPr>
+        <a:xfrm>
+          <a:off x="0" y="0"/>
+          <a:ext cx="0" cy="0"/>
+          <a:chOff x="0" y="0"/>
+          <a:chExt cx="0" cy="0"/>
+        </a:xfrm>
+      </p:grpSpPr>
+      <p:sp>
+        <p:nvSpPr>
+          <p:cNvPr id="23" name="사각형: 둥근 모서리 22">
+            <a:extLst>
+              <a:ext uri="{FF2B5EF4-FFF2-40B4-BE49-F238E27FC236}">
+                <a16:creationId xmlns:a16="http://schemas.microsoft.com/office/drawing/2014/main" id="{F4731D38-8163-4621-8804-C535A6036187}"/>
+              </a:ext>
+            </a:extLst>
+          </p:cNvPr>
+          <p:cNvSpPr/>
+          <p:nvPr/>
+        </p:nvSpPr>
+        <p:spPr>
+          <a:xfrm>
+            <a:off x="5434204" y="2232913"/>
+            <a:ext cx="1323591" cy="322255"/>
+          </a:xfrm>
+          <a:prstGeom prst="roundRect">
+            <a:avLst>
+              <a:gd name="adj" fmla="val 13668"/>
+            </a:avLst>
+          </a:prstGeom>
+          <a:solidFill>
+            <a:schemeClr val="bg2">
+              <a:lumMod val="90000"/>
+            </a:schemeClr>
+          </a:solidFill>
+          <a:ln w="25400">
+            <a:solidFill>
+              <a:schemeClr val="bg2">
+                <a:lumMod val="25000"/>
+              </a:schemeClr>
+            </a:solidFill>
+            <a:prstDash val="solid"/>
+          </a:ln>
+        </p:spPr>
+        <p:style>
+          <a:lnRef idx="2">
+            <a:schemeClr val="accent1">
+              <a:shade val="50000"/>
+            </a:schemeClr>
+          </a:lnRef>
+          <a:fillRef idx="1">
+            <a:schemeClr val="accent1"/>
+          </a:fillRef>
+          <a:effectRef idx="0">
+            <a:schemeClr val="accent1"/>
+          </a:effectRef>
+          <a:fontRef idx="minor">
+            <a:schemeClr val="lt1"/>
+          </a:fontRef>
+        </p:style>
+        <p:txBody>
+          <a:bodyPr rtlCol="0" anchor="ctr"/>
+          <a:lstStyle/>
+          <a:p>
+            <a:pPr algn="ctr"/>
+            <a:r>
+              <a:rPr lang="en-US" altLang="ko-KR" sz="1400">
+                <a:solidFill>
+                  <a:schemeClr val="tx1">
+                    <a:lumMod val="85000"/>
+                    <a:lumOff val="15000"/>
+                  </a:schemeClr>
+                </a:solidFill>
+              </a:rPr>
+              <a:t>Renderpass</a:t>
+            </a:r>
+            <a:endParaRPr lang="ko-KR" altLang="en-US" sz="1400">
+              <a:solidFill>
+                <a:schemeClr val="tx1">
+                  <a:lumMod val="85000"/>
+                  <a:lumOff val="15000"/>
+                </a:schemeClr>
+              </a:solidFill>
+            </a:endParaRPr>
+          </a:p>
+        </p:txBody>
+      </p:sp>
+      <p:sp>
+        <p:nvSpPr>
+          <p:cNvPr id="24" name="사각형: 둥근 모서리 23">
+            <a:extLst>
+              <a:ext uri="{FF2B5EF4-FFF2-40B4-BE49-F238E27FC236}">
+                <a16:creationId xmlns:a16="http://schemas.microsoft.com/office/drawing/2014/main" id="{C38FA2A6-1667-417D-9148-4ED98CF6F901}"/>
+              </a:ext>
+            </a:extLst>
+          </p:cNvPr>
+          <p:cNvSpPr/>
+          <p:nvPr/>
+        </p:nvSpPr>
+        <p:spPr>
+          <a:xfrm>
+            <a:off x="4449538" y="3267871"/>
+            <a:ext cx="890520" cy="322255"/>
+          </a:xfrm>
+          <a:prstGeom prst="roundRect">
+            <a:avLst>
+              <a:gd name="adj" fmla="val 13668"/>
+            </a:avLst>
+          </a:prstGeom>
+          <a:solidFill>
+            <a:schemeClr val="bg2">
+              <a:lumMod val="90000"/>
+            </a:schemeClr>
+          </a:solidFill>
+          <a:ln w="25400">
+            <a:solidFill>
+              <a:schemeClr val="bg2">
+                <a:lumMod val="25000"/>
+              </a:schemeClr>
+            </a:solidFill>
+            <a:prstDash val="solid"/>
+          </a:ln>
+        </p:spPr>
+        <p:style>
+          <a:lnRef idx="2">
+            <a:schemeClr val="accent1">
+              <a:shade val="50000"/>
+            </a:schemeClr>
+          </a:lnRef>
+          <a:fillRef idx="1">
+            <a:schemeClr val="accent1"/>
+          </a:fillRef>
+          <a:effectRef idx="0">
+            <a:schemeClr val="accent1"/>
+          </a:effectRef>
+          <a:fontRef idx="minor">
+            <a:schemeClr val="lt1"/>
+          </a:fontRef>
+        </p:style>
+        <p:txBody>
+          <a:bodyPr rtlCol="0" anchor="ctr"/>
+          <a:lstStyle/>
+          <a:p>
+            <a:pPr algn="ctr"/>
+            <a:r>
+              <a:rPr lang="en-US" altLang="ko-KR" sz="1400">
+                <a:solidFill>
+                  <a:schemeClr val="tx1">
+                    <a:lumMod val="85000"/>
+                    <a:lumOff val="15000"/>
+                  </a:schemeClr>
+                </a:solidFill>
+              </a:rPr>
+              <a:t>Subpass</a:t>
+            </a:r>
+            <a:endParaRPr lang="ko-KR" altLang="en-US" sz="1400">
+              <a:solidFill>
+                <a:schemeClr val="tx1">
+                  <a:lumMod val="85000"/>
+                  <a:lumOff val="15000"/>
+                </a:schemeClr>
+              </a:solidFill>
+            </a:endParaRPr>
+          </a:p>
+        </p:txBody>
+      </p:sp>
+      <p:sp>
+        <p:nvSpPr>
+          <p:cNvPr id="25" name="사각형: 둥근 모서리 24">
+            <a:extLst>
+              <a:ext uri="{FF2B5EF4-FFF2-40B4-BE49-F238E27FC236}">
+                <a16:creationId xmlns:a16="http://schemas.microsoft.com/office/drawing/2014/main" id="{20CC4E15-D3B7-45EF-8C23-A14FFC3C171C}"/>
+              </a:ext>
+            </a:extLst>
+          </p:cNvPr>
+          <p:cNvSpPr/>
+          <p:nvPr/>
+        </p:nvSpPr>
+        <p:spPr>
+          <a:xfrm>
+            <a:off x="6936429" y="3267872"/>
+            <a:ext cx="1269034" cy="322255"/>
+          </a:xfrm>
+          <a:prstGeom prst="roundRect">
+            <a:avLst>
+              <a:gd name="adj" fmla="val 13668"/>
+            </a:avLst>
+          </a:prstGeom>
+          <a:solidFill>
+            <a:schemeClr val="bg2">
+              <a:lumMod val="90000"/>
+            </a:schemeClr>
+          </a:solidFill>
+          <a:ln w="25400">
+            <a:solidFill>
+              <a:schemeClr val="bg2">
+                <a:lumMod val="25000"/>
+              </a:schemeClr>
+            </a:solidFill>
+            <a:prstDash val="solid"/>
+          </a:ln>
+        </p:spPr>
+        <p:style>
+          <a:lnRef idx="2">
+            <a:schemeClr val="accent1">
+              <a:shade val="50000"/>
+            </a:schemeClr>
+          </a:lnRef>
+          <a:fillRef idx="1">
+            <a:schemeClr val="accent1"/>
+          </a:fillRef>
+          <a:effectRef idx="0">
+            <a:schemeClr val="accent1"/>
+          </a:effectRef>
+          <a:fontRef idx="minor">
+            <a:schemeClr val="lt1"/>
+          </a:fontRef>
+        </p:style>
+        <p:txBody>
+          <a:bodyPr rtlCol="0" anchor="ctr"/>
+          <a:lstStyle/>
+          <a:p>
+            <a:pPr algn="ctr"/>
+            <a:r>
+              <a:rPr lang="en-US" altLang="ko-KR" sz="1400">
+                <a:solidFill>
+                  <a:schemeClr val="tx1">
+                    <a:lumMod val="85000"/>
+                    <a:lumOff val="15000"/>
+                  </a:schemeClr>
+                </a:solidFill>
+              </a:rPr>
+              <a:t>Attachment</a:t>
+            </a:r>
+            <a:endParaRPr lang="ko-KR" altLang="en-US" sz="1400">
+              <a:solidFill>
+                <a:schemeClr val="tx1">
+                  <a:lumMod val="85000"/>
+                  <a:lumOff val="15000"/>
+                </a:schemeClr>
+              </a:solidFill>
+            </a:endParaRPr>
+          </a:p>
+        </p:txBody>
+      </p:sp>
+      <p:sp>
+        <p:nvSpPr>
+          <p:cNvPr id="26" name="직사각형 25">
+            <a:extLst>
+              <a:ext uri="{FF2B5EF4-FFF2-40B4-BE49-F238E27FC236}">
+                <a16:creationId xmlns:a16="http://schemas.microsoft.com/office/drawing/2014/main" id="{B946CEAB-F80C-400B-9B34-8B26A9CB75CD}"/>
+              </a:ext>
+            </a:extLst>
+          </p:cNvPr>
+          <p:cNvSpPr/>
+          <p:nvPr/>
+        </p:nvSpPr>
+        <p:spPr>
+          <a:xfrm>
+            <a:off x="4621056" y="2635940"/>
+            <a:ext cx="547484" cy="307777"/>
+          </a:xfrm>
+          <a:prstGeom prst="rect">
+            <a:avLst/>
+          </a:prstGeom>
+        </p:spPr>
+        <p:txBody>
+          <a:bodyPr wrap="square">
+            <a:spAutoFit/>
+          </a:bodyPr>
+          <a:lstStyle/>
+          <a:p>
+            <a:pPr algn="ctr"/>
+            <a:r>
+              <a:rPr lang="en-US" altLang="ko-KR" sz="1400">
+                <a:solidFill>
+                  <a:schemeClr val="tx1">
+                    <a:lumMod val="50000"/>
+                    <a:lumOff val="50000"/>
+                  </a:schemeClr>
+                </a:solidFill>
+              </a:rPr>
+              <a:t>hold</a:t>
+            </a:r>
+          </a:p>
+        </p:txBody>
+      </p:sp>
+      <p:sp>
+        <p:nvSpPr>
+          <p:cNvPr id="27" name="직사각형 26">
+            <a:extLst>
+              <a:ext uri="{FF2B5EF4-FFF2-40B4-BE49-F238E27FC236}">
+                <a16:creationId xmlns:a16="http://schemas.microsoft.com/office/drawing/2014/main" id="{E0AC11A8-5D4A-4E39-A1E9-2DF7B739AA4E}"/>
+              </a:ext>
+            </a:extLst>
+          </p:cNvPr>
+          <p:cNvSpPr/>
+          <p:nvPr/>
+        </p:nvSpPr>
+        <p:spPr>
+          <a:xfrm>
+            <a:off x="6936429" y="2635940"/>
+            <a:ext cx="547484" cy="307777"/>
+          </a:xfrm>
+          <a:prstGeom prst="rect">
+            <a:avLst/>
+          </a:prstGeom>
+        </p:spPr>
+        <p:txBody>
+          <a:bodyPr wrap="square">
+            <a:spAutoFit/>
+          </a:bodyPr>
+          <a:lstStyle/>
+          <a:p>
+            <a:pPr algn="ctr"/>
+            <a:r>
+              <a:rPr lang="en-US" altLang="ko-KR" sz="1400">
+                <a:solidFill>
+                  <a:schemeClr val="tx1">
+                    <a:lumMod val="50000"/>
+                    <a:lumOff val="50000"/>
+                  </a:schemeClr>
+                </a:solidFill>
+              </a:rPr>
+              <a:t>hold</a:t>
+            </a:r>
+          </a:p>
+        </p:txBody>
+      </p:sp>
+      <p:sp>
+        <p:nvSpPr>
+          <p:cNvPr id="28" name="직사각형 27">
+            <a:extLst>
+              <a:ext uri="{FF2B5EF4-FFF2-40B4-BE49-F238E27FC236}">
+                <a16:creationId xmlns:a16="http://schemas.microsoft.com/office/drawing/2014/main" id="{CAD7DF8B-F0A2-4DBF-BEAA-C0F4E5E55524}"/>
+              </a:ext>
+            </a:extLst>
+          </p:cNvPr>
+          <p:cNvSpPr/>
+          <p:nvPr/>
+        </p:nvSpPr>
+        <p:spPr>
+          <a:xfrm>
+            <a:off x="5640794" y="3121221"/>
+            <a:ext cx="994898" cy="307777"/>
+          </a:xfrm>
+          <a:prstGeom prst="rect">
+            <a:avLst/>
+          </a:prstGeom>
+        </p:spPr>
+        <p:txBody>
+          <a:bodyPr wrap="square">
+            <a:spAutoFit/>
+          </a:bodyPr>
+          <a:lstStyle/>
+          <a:p>
+            <a:pPr algn="ctr"/>
+            <a:r>
+              <a:rPr lang="en-US" altLang="ko-KR" sz="1400">
+                <a:solidFill>
+                  <a:schemeClr val="tx1">
+                    <a:lumMod val="50000"/>
+                    <a:lumOff val="50000"/>
+                  </a:schemeClr>
+                </a:solidFill>
+              </a:rPr>
+              <a:t>reference</a:t>
+            </a:r>
+          </a:p>
+        </p:txBody>
+      </p:sp>
+      <p:cxnSp>
+        <p:nvCxnSpPr>
+          <p:cNvPr id="29" name="직선 화살표 연결선 28">
+            <a:extLst>
+              <a:ext uri="{FF2B5EF4-FFF2-40B4-BE49-F238E27FC236}">
+                <a16:creationId xmlns:a16="http://schemas.microsoft.com/office/drawing/2014/main" id="{8473C938-933F-47CD-9A91-E0EA8FB985E4}"/>
+              </a:ext>
+            </a:extLst>
+          </p:cNvPr>
+          <p:cNvCxnSpPr>
+            <a:cxnSpLocks/>
+            <a:stCxn id="24" idx="0"/>
+            <a:endCxn id="23" idx="2"/>
+          </p:cNvCxnSpPr>
+          <p:nvPr/>
+        </p:nvCxnSpPr>
+        <p:spPr>
+          <a:xfrm flipV="1">
+            <a:off x="4894798" y="2555168"/>
+            <a:ext cx="1201202" cy="712703"/>
+          </a:xfrm>
+          <a:prstGeom prst="straightConnector1">
+            <a:avLst/>
+          </a:prstGeom>
+          <a:ln w="25400">
+            <a:solidFill>
+              <a:schemeClr val="tx1">
+                <a:lumMod val="50000"/>
+                <a:lumOff val="50000"/>
+              </a:schemeClr>
+            </a:solidFill>
+            <a:tailEnd type="triangle"/>
+          </a:ln>
+        </p:spPr>
+        <p:style>
+          <a:lnRef idx="1">
+            <a:schemeClr val="accent1"/>
+          </a:lnRef>
+          <a:fillRef idx="0">
+            <a:schemeClr val="accent1"/>
+          </a:fillRef>
+          <a:effectRef idx="0">
+            <a:schemeClr val="accent1"/>
+          </a:effectRef>
+          <a:fontRef idx="minor">
+            <a:schemeClr val="tx1"/>
+          </a:fontRef>
+        </p:style>
+      </p:cxnSp>
+      <p:cxnSp>
+        <p:nvCxnSpPr>
+          <p:cNvPr id="30" name="직선 화살표 연결선 29">
+            <a:extLst>
+              <a:ext uri="{FF2B5EF4-FFF2-40B4-BE49-F238E27FC236}">
+                <a16:creationId xmlns:a16="http://schemas.microsoft.com/office/drawing/2014/main" id="{55CB866E-5045-4520-82E5-E68E484E33E5}"/>
+              </a:ext>
+            </a:extLst>
+          </p:cNvPr>
+          <p:cNvCxnSpPr>
+            <a:cxnSpLocks/>
+            <a:stCxn id="25" idx="0"/>
+            <a:endCxn id="23" idx="2"/>
+          </p:cNvCxnSpPr>
+          <p:nvPr/>
+        </p:nvCxnSpPr>
+        <p:spPr>
+          <a:xfrm flipH="1" flipV="1">
+            <a:off x="6096000" y="2555168"/>
+            <a:ext cx="1474946" cy="712704"/>
+          </a:xfrm>
+          <a:prstGeom prst="straightConnector1">
+            <a:avLst/>
+          </a:prstGeom>
+          <a:ln w="25400">
+            <a:solidFill>
+              <a:schemeClr val="tx1">
+                <a:lumMod val="50000"/>
+                <a:lumOff val="50000"/>
+              </a:schemeClr>
+            </a:solidFill>
+            <a:tailEnd type="triangle"/>
+          </a:ln>
+        </p:spPr>
+        <p:style>
+          <a:lnRef idx="1">
+            <a:schemeClr val="accent1"/>
+          </a:lnRef>
+          <a:fillRef idx="0">
+            <a:schemeClr val="accent1"/>
+          </a:fillRef>
+          <a:effectRef idx="0">
+            <a:schemeClr val="accent1"/>
+          </a:effectRef>
+          <a:fontRef idx="minor">
+            <a:schemeClr val="tx1"/>
+          </a:fontRef>
+        </p:style>
+      </p:cxnSp>
+      <p:cxnSp>
+        <p:nvCxnSpPr>
+          <p:cNvPr id="33" name="직선 화살표 연결선 32">
+            <a:extLst>
+              <a:ext uri="{FF2B5EF4-FFF2-40B4-BE49-F238E27FC236}">
+                <a16:creationId xmlns:a16="http://schemas.microsoft.com/office/drawing/2014/main" id="{8937BAE7-CF2A-424B-90EA-D5303D49543E}"/>
+              </a:ext>
+            </a:extLst>
+          </p:cNvPr>
+          <p:cNvCxnSpPr>
+            <a:cxnSpLocks/>
+            <a:stCxn id="24" idx="3"/>
+            <a:endCxn id="25" idx="1"/>
+          </p:cNvCxnSpPr>
+          <p:nvPr/>
+        </p:nvCxnSpPr>
+        <p:spPr>
+          <a:xfrm>
+            <a:off x="5340058" y="3428999"/>
+            <a:ext cx="1596371" cy="1"/>
+          </a:xfrm>
+          <a:prstGeom prst="straightConnector1">
+            <a:avLst/>
+          </a:prstGeom>
+          <a:ln w="25400">
+            <a:solidFill>
+              <a:schemeClr val="tx1">
+                <a:lumMod val="50000"/>
+                <a:lumOff val="50000"/>
+              </a:schemeClr>
+            </a:solidFill>
+            <a:tailEnd type="triangle"/>
+          </a:ln>
+        </p:spPr>
+        <p:style>
+          <a:lnRef idx="1">
+            <a:schemeClr val="accent1"/>
+          </a:lnRef>
+          <a:fillRef idx="0">
+            <a:schemeClr val="accent1"/>
+          </a:fillRef>
+          <a:effectRef idx="0">
+            <a:schemeClr val="accent1"/>
+          </a:effectRef>
+          <a:fontRef idx="minor">
+            <a:schemeClr val="tx1"/>
+          </a:fontRef>
+        </p:style>
+      </p:cxnSp>
+    </p:spTree>
+    <p:extLst>
+      <p:ext uri="{BB962C8B-B14F-4D97-AF65-F5344CB8AC3E}">
+        <p14:creationId xmlns:p14="http://schemas.microsoft.com/office/powerpoint/2010/main" val="3053498206"/>
       </p:ext>
     </p:extLst>
   </p:cSld>

</xml_diff>

<commit_message>
working on creating image views and framebuffers
</commit_message>
<xml_diff>
--- a/vulkan.pptx
+++ b/vulkan.pptx
@@ -11,8 +11,8 @@
     <p:sldId id="260" r:id="rId5"/>
     <p:sldId id="261" r:id="rId6"/>
     <p:sldId id="262" r:id="rId7"/>
-    <p:sldId id="264" r:id="rId8"/>
-    <p:sldId id="265" r:id="rId9"/>
+    <p:sldId id="265" r:id="rId8"/>
+    <p:sldId id="264" r:id="rId9"/>
   </p:sldIdLst>
   <p:sldSz cx="12192000" cy="6858000"/>
   <p:notesSz cx="6858000" cy="9144000"/>
@@ -266,7 +266,7 @@
           <a:p>
             <a:fld id="{C70F4A24-0500-4741-BCE2-9D99BEF0B64A}" type="datetimeFigureOut">
               <a:rPr lang="ko-KR" altLang="en-US" smtClean="0"/>
-              <a:t>2018-06-15</a:t>
+              <a:t>2019-09-28</a:t>
             </a:fld>
             <a:endParaRPr lang="ko-KR" altLang="en-US"/>
           </a:p>
@@ -464,7 +464,7 @@
           <a:p>
             <a:fld id="{C70F4A24-0500-4741-BCE2-9D99BEF0B64A}" type="datetimeFigureOut">
               <a:rPr lang="ko-KR" altLang="en-US" smtClean="0"/>
-              <a:t>2018-06-15</a:t>
+              <a:t>2019-09-28</a:t>
             </a:fld>
             <a:endParaRPr lang="ko-KR" altLang="en-US"/>
           </a:p>
@@ -672,7 +672,7 @@
           <a:p>
             <a:fld id="{C70F4A24-0500-4741-BCE2-9D99BEF0B64A}" type="datetimeFigureOut">
               <a:rPr lang="ko-KR" altLang="en-US" smtClean="0"/>
-              <a:t>2018-06-15</a:t>
+              <a:t>2019-09-28</a:t>
             </a:fld>
             <a:endParaRPr lang="ko-KR" altLang="en-US"/>
           </a:p>
@@ -870,7 +870,7 @@
           <a:p>
             <a:fld id="{C70F4A24-0500-4741-BCE2-9D99BEF0B64A}" type="datetimeFigureOut">
               <a:rPr lang="ko-KR" altLang="en-US" smtClean="0"/>
-              <a:t>2018-06-15</a:t>
+              <a:t>2019-09-28</a:t>
             </a:fld>
             <a:endParaRPr lang="ko-KR" altLang="en-US"/>
           </a:p>
@@ -1145,7 +1145,7 @@
           <a:p>
             <a:fld id="{C70F4A24-0500-4741-BCE2-9D99BEF0B64A}" type="datetimeFigureOut">
               <a:rPr lang="ko-KR" altLang="en-US" smtClean="0"/>
-              <a:t>2018-06-15</a:t>
+              <a:t>2019-09-28</a:t>
             </a:fld>
             <a:endParaRPr lang="ko-KR" altLang="en-US"/>
           </a:p>
@@ -1410,7 +1410,7 @@
           <a:p>
             <a:fld id="{C70F4A24-0500-4741-BCE2-9D99BEF0B64A}" type="datetimeFigureOut">
               <a:rPr lang="ko-KR" altLang="en-US" smtClean="0"/>
-              <a:t>2018-06-15</a:t>
+              <a:t>2019-09-28</a:t>
             </a:fld>
             <a:endParaRPr lang="ko-KR" altLang="en-US"/>
           </a:p>
@@ -1822,7 +1822,7 @@
           <a:p>
             <a:fld id="{C70F4A24-0500-4741-BCE2-9D99BEF0B64A}" type="datetimeFigureOut">
               <a:rPr lang="ko-KR" altLang="en-US" smtClean="0"/>
-              <a:t>2018-06-15</a:t>
+              <a:t>2019-09-28</a:t>
             </a:fld>
             <a:endParaRPr lang="ko-KR" altLang="en-US"/>
           </a:p>
@@ -1963,7 +1963,7 @@
           <a:p>
             <a:fld id="{C70F4A24-0500-4741-BCE2-9D99BEF0B64A}" type="datetimeFigureOut">
               <a:rPr lang="ko-KR" altLang="en-US" smtClean="0"/>
-              <a:t>2018-06-15</a:t>
+              <a:t>2019-09-28</a:t>
             </a:fld>
             <a:endParaRPr lang="ko-KR" altLang="en-US"/>
           </a:p>
@@ -2076,7 +2076,7 @@
           <a:p>
             <a:fld id="{C70F4A24-0500-4741-BCE2-9D99BEF0B64A}" type="datetimeFigureOut">
               <a:rPr lang="ko-KR" altLang="en-US" smtClean="0"/>
-              <a:t>2018-06-15</a:t>
+              <a:t>2019-09-28</a:t>
             </a:fld>
             <a:endParaRPr lang="ko-KR" altLang="en-US"/>
           </a:p>
@@ -2387,7 +2387,7 @@
           <a:p>
             <a:fld id="{C70F4A24-0500-4741-BCE2-9D99BEF0B64A}" type="datetimeFigureOut">
               <a:rPr lang="ko-KR" altLang="en-US" smtClean="0"/>
-              <a:t>2018-06-15</a:t>
+              <a:t>2019-09-28</a:t>
             </a:fld>
             <a:endParaRPr lang="ko-KR" altLang="en-US"/>
           </a:p>
@@ -2675,7 +2675,7 @@
           <a:p>
             <a:fld id="{C70F4A24-0500-4741-BCE2-9D99BEF0B64A}" type="datetimeFigureOut">
               <a:rPr lang="ko-KR" altLang="en-US" smtClean="0"/>
-              <a:t>2018-06-15</a:t>
+              <a:t>2019-09-28</a:t>
             </a:fld>
             <a:endParaRPr lang="ko-KR" altLang="en-US"/>
           </a:p>
@@ -2916,7 +2916,7 @@
           <a:p>
             <a:fld id="{C70F4A24-0500-4741-BCE2-9D99BEF0B64A}" type="datetimeFigureOut">
               <a:rPr lang="ko-KR" altLang="en-US" smtClean="0"/>
-              <a:t>2018-06-15</a:t>
+              <a:t>2019-09-28</a:t>
             </a:fld>
             <a:endParaRPr lang="ko-KR" altLang="en-US"/>
           </a:p>
@@ -13770,10 +13770,10 @@
       </p:grpSpPr>
       <p:sp>
         <p:nvSpPr>
-          <p:cNvPr id="64" name="TextBox 63">
-            <a:extLst>
-              <a:ext uri="{FF2B5EF4-FFF2-40B4-BE49-F238E27FC236}">
-                <a16:creationId xmlns:a16="http://schemas.microsoft.com/office/drawing/2014/main" id="{C949A911-30CD-4E8B-8D56-09D3D3C9CE98}"/>
+          <p:cNvPr id="11" name="TextBox 10">
+            <a:extLst>
+              <a:ext uri="{FF2B5EF4-FFF2-40B4-BE49-F238E27FC236}">
+                <a16:creationId xmlns:a16="http://schemas.microsoft.com/office/drawing/2014/main" id="{81E0DA48-C29D-456A-BF5F-351008F24BBB}"/>
               </a:ext>
             </a:extLst>
           </p:cNvPr>
@@ -13783,7 +13783,7 @@
         <p:spPr>
           <a:xfrm>
             <a:off x="0" y="15118"/>
-            <a:ext cx="2441117" cy="461665"/>
+            <a:ext cx="1852430" cy="461665"/>
           </a:xfrm>
           <a:prstGeom prst="rect">
             <a:avLst/>
@@ -13805,29 +13805,7 @@
                   </a:schemeClr>
                 </a:solidFill>
               </a:rPr>
-              <a:t>Command</a:t>
-            </a:r>
-            <a:r>
-              <a:rPr lang="ko-KR" altLang="en-US" sz="2400" b="1">
-                <a:solidFill>
-                  <a:schemeClr val="tx1">
-                    <a:lumMod val="50000"/>
-                    <a:lumOff val="50000"/>
-                  </a:schemeClr>
-                </a:solidFill>
-              </a:rPr>
-              <a:t> </a:t>
-            </a:r>
-            <a:r>
-              <a:rPr lang="en-US" altLang="ko-KR" sz="2400" b="1">
-                <a:solidFill>
-                  <a:schemeClr val="tx1">
-                    <a:lumMod val="50000"/>
-                    <a:lumOff val="50000"/>
-                  </a:schemeClr>
-                </a:solidFill>
-              </a:rPr>
-              <a:t>Pool</a:t>
+              <a:t>RenderPass</a:t>
             </a:r>
             <a:endParaRPr lang="ko-KR" altLang="en-US" sz="2400">
               <a:solidFill>
@@ -13842,10 +13820,10 @@
       </p:sp>
       <p:sp>
         <p:nvSpPr>
-          <p:cNvPr id="69" name="사각형: 둥근 모서리 68">
-            <a:extLst>
-              <a:ext uri="{FF2B5EF4-FFF2-40B4-BE49-F238E27FC236}">
-                <a16:creationId xmlns:a16="http://schemas.microsoft.com/office/drawing/2014/main" id="{4B6180A7-9D48-4037-942E-84B520DF1A34}"/>
+          <p:cNvPr id="15" name="사각형: 둥근 모서리 14">
+            <a:extLst>
+              <a:ext uri="{FF2B5EF4-FFF2-40B4-BE49-F238E27FC236}">
+                <a16:creationId xmlns:a16="http://schemas.microsoft.com/office/drawing/2014/main" id="{A5A89842-6FCB-4E2B-935E-AA0839DB2591}"/>
               </a:ext>
             </a:extLst>
           </p:cNvPr>
@@ -13854,27 +13832,25 @@
         </p:nvSpPr>
         <p:spPr>
           <a:xfrm>
-            <a:off x="865463" y="1621588"/>
-            <a:ext cx="1249961" cy="461664"/>
+            <a:off x="2899957" y="1400774"/>
+            <a:ext cx="6392085" cy="4056452"/>
           </a:xfrm>
           <a:prstGeom prst="roundRect">
             <a:avLst>
-              <a:gd name="adj" fmla="val 13668"/>
+              <a:gd name="adj" fmla="val 3568"/>
             </a:avLst>
           </a:prstGeom>
           <a:solidFill>
-            <a:schemeClr val="accent6">
-              <a:lumMod val="50000"/>
-            </a:schemeClr>
+            <a:srgbClr val="FFF9E7"/>
           </a:solidFill>
-          <a:ln w="25400">
+          <a:ln w="19050">
             <a:solidFill>
-              <a:schemeClr val="accent6">
-                <a:lumMod val="20000"/>
-                <a:lumOff val="80000"/>
+              <a:schemeClr val="accent4">
+                <a:lumMod val="60000"/>
+                <a:lumOff val="40000"/>
               </a:schemeClr>
             </a:solidFill>
-            <a:prstDash val="solid"/>
+            <a:prstDash val="sysDash"/>
           </a:ln>
         </p:spPr>
         <p:style>
@@ -13894,27 +13870,20 @@
           </a:fontRef>
         </p:style>
         <p:txBody>
-          <a:bodyPr rtlCol="0" anchor="ctr"/>
-          <a:lstStyle/>
-          <a:p>
-            <a:pPr algn="ctr"/>
-            <a:r>
-              <a:rPr lang="en-US" altLang="ko-KR" sz="1100">
-                <a:solidFill>
-                  <a:schemeClr val="accent6">
-                    <a:lumMod val="20000"/>
-                    <a:lumOff val="80000"/>
-                  </a:schemeClr>
+          <a:bodyPr rtlCol="0" anchor="b"/>
+          <a:lstStyle/>
+          <a:p>
+            <a:r>
+              <a:rPr lang="en-US" altLang="ko-KR" sz="1100" b="1">
+                <a:solidFill>
+                  <a:srgbClr val="FEC012"/>
                 </a:solidFill>
               </a:rPr>
-              <a:t>Present Queue Command Pool</a:t>
-            </a:r>
-            <a:endParaRPr lang="ko-KR" altLang="en-US" sz="1100">
+              <a:t>RenderPass</a:t>
+            </a:r>
+            <a:endParaRPr lang="ko-KR" altLang="en-US" sz="1100" b="1">
               <a:solidFill>
-                <a:schemeClr val="accent6">
-                  <a:lumMod val="20000"/>
-                  <a:lumOff val="80000"/>
-                </a:schemeClr>
+                <a:srgbClr val="FEC012"/>
               </a:solidFill>
             </a:endParaRPr>
           </a:p>
@@ -13922,10 +13891,10 @@
       </p:sp>
       <p:sp>
         <p:nvSpPr>
-          <p:cNvPr id="70" name="사각형: 둥근 모서리 69">
-            <a:extLst>
-              <a:ext uri="{FF2B5EF4-FFF2-40B4-BE49-F238E27FC236}">
-                <a16:creationId xmlns:a16="http://schemas.microsoft.com/office/drawing/2014/main" id="{7AB0AF86-9994-4628-8949-1D0C9845FE1B}"/>
+          <p:cNvPr id="16" name="사각형: 둥근 모서리 15">
+            <a:extLst>
+              <a:ext uri="{FF2B5EF4-FFF2-40B4-BE49-F238E27FC236}">
+                <a16:creationId xmlns:a16="http://schemas.microsoft.com/office/drawing/2014/main" id="{CFA25830-171A-48F2-AAC3-A708970E8620}"/>
               </a:ext>
             </a:extLst>
           </p:cNvPr>
@@ -13934,8 +13903,8 @@
         </p:nvSpPr>
         <p:spPr>
           <a:xfrm>
-            <a:off x="1133431" y="794832"/>
-            <a:ext cx="714024" cy="237167"/>
+            <a:off x="5573949" y="2383866"/>
+            <a:ext cx="1044102" cy="338866"/>
           </a:xfrm>
           <a:prstGeom prst="roundRect">
             <a:avLst>
@@ -13943,16 +13912,13 @@
             </a:avLst>
           </a:prstGeom>
           <a:solidFill>
-            <a:srgbClr val="F2F7FC"/>
+            <a:srgbClr val="D5B8EA"/>
           </a:solidFill>
-          <a:ln w="19050">
+          <a:ln w="25400">
             <a:solidFill>
-              <a:schemeClr val="accent5">
-                <a:lumMod val="60000"/>
-                <a:lumOff val="40000"/>
-              </a:schemeClr>
+              <a:srgbClr val="7030A0"/>
             </a:solidFill>
-            <a:prstDash val="sysDash"/>
+            <a:prstDash val="solid"/>
           </a:ln>
         </p:spPr>
         <p:style>
@@ -13977,20 +13943,16 @@
           <a:p>
             <a:pPr algn="ctr"/>
             <a:r>
-              <a:rPr lang="en-US" altLang="ko-KR" sz="1100" b="1">
-                <a:solidFill>
-                  <a:schemeClr val="accent5">
-                    <a:lumMod val="50000"/>
-                  </a:schemeClr>
+              <a:rPr lang="en-US" altLang="ko-KR" sz="1100">
+                <a:solidFill>
+                  <a:srgbClr val="7030A0"/>
                 </a:solidFill>
               </a:rPr>
-              <a:t>Queue</a:t>
-            </a:r>
-            <a:endParaRPr lang="ko-KR" altLang="en-US" sz="1100" b="1">
+              <a:t>subpass</a:t>
+            </a:r>
+            <a:endParaRPr lang="ko-KR" altLang="en-US" sz="1100">
               <a:solidFill>
-                <a:schemeClr val="accent5">
-                  <a:lumMod val="50000"/>
-                </a:schemeClr>
+                <a:srgbClr val="7030A0"/>
               </a:solidFill>
             </a:endParaRPr>
           </a:p>
@@ -13998,10 +13960,10 @@
       </p:sp>
       <p:sp>
         <p:nvSpPr>
-          <p:cNvPr id="4" name="타원 3">
-            <a:extLst>
-              <a:ext uri="{FF2B5EF4-FFF2-40B4-BE49-F238E27FC236}">
-                <a16:creationId xmlns:a16="http://schemas.microsoft.com/office/drawing/2014/main" id="{76E704CC-73E1-4339-BB0A-5E17FAD6F741}"/>
+          <p:cNvPr id="17" name="사각형: 둥근 모서리 16">
+            <a:extLst>
+              <a:ext uri="{FF2B5EF4-FFF2-40B4-BE49-F238E27FC236}">
+                <a16:creationId xmlns:a16="http://schemas.microsoft.com/office/drawing/2014/main" id="{C2DB9C57-259E-47D1-A795-DDB9B3525018}"/>
               </a:ext>
             </a:extLst>
           </p:cNvPr>
@@ -14010,23 +13972,22 @@
         </p:nvSpPr>
         <p:spPr>
           <a:xfrm>
-            <a:off x="1449742" y="1134692"/>
-            <a:ext cx="81402" cy="81402"/>
-          </a:xfrm>
-          <a:prstGeom prst="ellipse">
-            <a:avLst/>
+            <a:off x="5573949" y="3259567"/>
+            <a:ext cx="1044102" cy="338866"/>
+          </a:xfrm>
+          <a:prstGeom prst="roundRect">
+            <a:avLst>
+              <a:gd name="adj" fmla="val 18826"/>
+            </a:avLst>
           </a:prstGeom>
           <a:solidFill>
-            <a:schemeClr val="accent5">
-              <a:lumMod val="20000"/>
-              <a:lumOff val="80000"/>
-            </a:schemeClr>
+            <a:srgbClr val="D5B8EA"/>
           </a:solidFill>
           <a:ln w="25400">
-            <a:noFill/>
+            <a:solidFill>
+              <a:srgbClr val="7030A0"/>
+            </a:solidFill>
             <a:prstDash val="solid"/>
-            <a:headEnd type="none"/>
-            <a:tailEnd type="triangle"/>
           </a:ln>
         </p:spPr>
         <p:style>
@@ -14050,16 +14011,28 @@
           <a:lstStyle/>
           <a:p>
             <a:pPr algn="ctr"/>
-            <a:endParaRPr lang="ko-KR" altLang="en-US"/>
-          </a:p>
-        </p:txBody>
-      </p:sp>
-      <p:sp>
-        <p:nvSpPr>
-          <p:cNvPr id="71" name="타원 70">
-            <a:extLst>
-              <a:ext uri="{FF2B5EF4-FFF2-40B4-BE49-F238E27FC236}">
-                <a16:creationId xmlns:a16="http://schemas.microsoft.com/office/drawing/2014/main" id="{7D0C3197-46BF-4B2B-97D2-CF50E4C81A1D}"/>
+            <a:r>
+              <a:rPr lang="en-US" altLang="ko-KR" sz="1100">
+                <a:solidFill>
+                  <a:srgbClr val="7030A0"/>
+                </a:solidFill>
+              </a:rPr>
+              <a:t>subpass</a:t>
+            </a:r>
+            <a:endParaRPr lang="ko-KR" altLang="en-US" sz="1100">
+              <a:solidFill>
+                <a:srgbClr val="7030A0"/>
+              </a:solidFill>
+            </a:endParaRPr>
+          </a:p>
+        </p:txBody>
+      </p:sp>
+      <p:sp>
+        <p:nvSpPr>
+          <p:cNvPr id="18" name="사각형: 둥근 모서리 17">
+            <a:extLst>
+              <a:ext uri="{FF2B5EF4-FFF2-40B4-BE49-F238E27FC236}">
+                <a16:creationId xmlns:a16="http://schemas.microsoft.com/office/drawing/2014/main" id="{41F91E25-2BCF-4E54-8F02-666CF438F37B}"/>
               </a:ext>
             </a:extLst>
           </p:cNvPr>
@@ -14068,23 +14041,22 @@
         </p:nvSpPr>
         <p:spPr>
           <a:xfrm>
-            <a:off x="1449742" y="1286092"/>
-            <a:ext cx="81402" cy="81402"/>
-          </a:xfrm>
-          <a:prstGeom prst="ellipse">
-            <a:avLst/>
+            <a:off x="5573949" y="4135268"/>
+            <a:ext cx="1044102" cy="338866"/>
+          </a:xfrm>
+          <a:prstGeom prst="roundRect">
+            <a:avLst>
+              <a:gd name="adj" fmla="val 18826"/>
+            </a:avLst>
           </a:prstGeom>
           <a:solidFill>
-            <a:schemeClr val="accent5">
-              <a:lumMod val="20000"/>
-              <a:lumOff val="80000"/>
-            </a:schemeClr>
+            <a:srgbClr val="D5B8EA"/>
           </a:solidFill>
           <a:ln w="25400">
-            <a:noFill/>
+            <a:solidFill>
+              <a:srgbClr val="7030A0"/>
+            </a:solidFill>
             <a:prstDash val="solid"/>
-            <a:headEnd type="none"/>
-            <a:tailEnd type="triangle"/>
           </a:ln>
         </p:spPr>
         <p:style>
@@ -14108,143 +14080,17 @@
           <a:lstStyle/>
           <a:p>
             <a:pPr algn="ctr"/>
-            <a:endParaRPr lang="ko-KR" altLang="en-US"/>
-          </a:p>
-        </p:txBody>
-      </p:sp>
-      <p:sp>
-        <p:nvSpPr>
-          <p:cNvPr id="72" name="타원 71">
-            <a:extLst>
-              <a:ext uri="{FF2B5EF4-FFF2-40B4-BE49-F238E27FC236}">
-                <a16:creationId xmlns:a16="http://schemas.microsoft.com/office/drawing/2014/main" id="{5F364FD6-0592-470D-AE28-48C56563113C}"/>
-              </a:ext>
-            </a:extLst>
-          </p:cNvPr>
-          <p:cNvSpPr/>
-          <p:nvPr/>
-        </p:nvSpPr>
-        <p:spPr>
-          <a:xfrm>
-            <a:off x="1449742" y="1437492"/>
-            <a:ext cx="81402" cy="81402"/>
-          </a:xfrm>
-          <a:prstGeom prst="ellipse">
-            <a:avLst/>
-          </a:prstGeom>
-          <a:solidFill>
-            <a:schemeClr val="accent5">
-              <a:lumMod val="20000"/>
-              <a:lumOff val="80000"/>
-            </a:schemeClr>
-          </a:solidFill>
-          <a:ln w="25400">
-            <a:noFill/>
-            <a:prstDash val="solid"/>
-            <a:headEnd type="none"/>
-            <a:tailEnd type="triangle"/>
-          </a:ln>
-        </p:spPr>
-        <p:style>
-          <a:lnRef idx="2">
-            <a:schemeClr val="accent1">
-              <a:shade val="50000"/>
-            </a:schemeClr>
-          </a:lnRef>
-          <a:fillRef idx="1">
-            <a:schemeClr val="accent1"/>
-          </a:fillRef>
-          <a:effectRef idx="0">
-            <a:schemeClr val="accent1"/>
-          </a:effectRef>
-          <a:fontRef idx="minor">
-            <a:schemeClr val="lt1"/>
-          </a:fontRef>
-        </p:style>
-        <p:txBody>
-          <a:bodyPr rtlCol="0" anchor="ctr"/>
-          <a:lstStyle/>
-          <a:p>
-            <a:pPr algn="ctr"/>
-            <a:endParaRPr lang="ko-KR" altLang="en-US"/>
-          </a:p>
-        </p:txBody>
-      </p:sp>
-      <p:sp>
-        <p:nvSpPr>
-          <p:cNvPr id="73" name="사각형: 둥근 모서리 72">
-            <a:extLst>
-              <a:ext uri="{FF2B5EF4-FFF2-40B4-BE49-F238E27FC236}">
-                <a16:creationId xmlns:a16="http://schemas.microsoft.com/office/drawing/2014/main" id="{5CBB4D80-5E24-4F50-9835-46B18C667F4E}"/>
-              </a:ext>
-            </a:extLst>
-          </p:cNvPr>
-          <p:cNvSpPr/>
-          <p:nvPr/>
-        </p:nvSpPr>
-        <p:spPr>
-          <a:xfrm>
-            <a:off x="3448181" y="1621588"/>
-            <a:ext cx="1477687" cy="461664"/>
-          </a:xfrm>
-          <a:prstGeom prst="roundRect">
-            <a:avLst>
-              <a:gd name="adj" fmla="val 13668"/>
-            </a:avLst>
-          </a:prstGeom>
-          <a:solidFill>
-            <a:schemeClr val="accent6">
-              <a:lumMod val="50000"/>
-            </a:schemeClr>
-          </a:solidFill>
-          <a:ln w="25400">
-            <a:solidFill>
-              <a:schemeClr val="accent6">
-                <a:lumMod val="20000"/>
-                <a:lumOff val="80000"/>
-              </a:schemeClr>
-            </a:solidFill>
-            <a:prstDash val="solid"/>
-          </a:ln>
-        </p:spPr>
-        <p:style>
-          <a:lnRef idx="2">
-            <a:schemeClr val="accent1">
-              <a:shade val="50000"/>
-            </a:schemeClr>
-          </a:lnRef>
-          <a:fillRef idx="1">
-            <a:schemeClr val="accent1"/>
-          </a:fillRef>
-          <a:effectRef idx="0">
-            <a:schemeClr val="accent1"/>
-          </a:effectRef>
-          <a:fontRef idx="minor">
-            <a:schemeClr val="lt1"/>
-          </a:fontRef>
-        </p:style>
-        <p:txBody>
-          <a:bodyPr rtlCol="0" anchor="ctr"/>
-          <a:lstStyle/>
-          <a:p>
-            <a:pPr algn="ctr"/>
             <a:r>
               <a:rPr lang="en-US" altLang="ko-KR" sz="1100">
                 <a:solidFill>
-                  <a:schemeClr val="accent6">
-                    <a:lumMod val="20000"/>
-                    <a:lumOff val="80000"/>
-                  </a:schemeClr>
+                  <a:srgbClr val="7030A0"/>
                 </a:solidFill>
               </a:rPr>
-              <a:t>Present Queue Command Buffers</a:t>
+              <a:t>subpass</a:t>
             </a:r>
             <a:endParaRPr lang="ko-KR" altLang="en-US" sz="1100">
               <a:solidFill>
-                <a:schemeClr val="accent6">
-                  <a:lumMod val="20000"/>
-                  <a:lumOff val="80000"/>
-                </a:schemeClr>
+                <a:srgbClr val="7030A0"/>
               </a:solidFill>
             </a:endParaRPr>
           </a:p>
@@ -14252,10 +14098,10 @@
       </p:sp>
       <p:sp>
         <p:nvSpPr>
-          <p:cNvPr id="77" name="TextBox 76">
-            <a:extLst>
-              <a:ext uri="{FF2B5EF4-FFF2-40B4-BE49-F238E27FC236}">
-                <a16:creationId xmlns:a16="http://schemas.microsoft.com/office/drawing/2014/main" id="{B75C0C54-AE65-43AA-918E-896E9F7354D8}"/>
+          <p:cNvPr id="4" name="TextBox 3">
+            <a:extLst>
+              <a:ext uri="{FF2B5EF4-FFF2-40B4-BE49-F238E27FC236}">
+                <a16:creationId xmlns:a16="http://schemas.microsoft.com/office/drawing/2014/main" id="{E8C85B8C-D788-4BD2-BEAF-EF007555A6F7}"/>
               </a:ext>
             </a:extLst>
           </p:cNvPr>
@@ -14264,8 +14110,8 @@
         </p:nvSpPr>
         <p:spPr>
           <a:xfrm>
-            <a:off x="3549671" y="1375367"/>
-            <a:ext cx="1274708" cy="246221"/>
+            <a:off x="236225" y="2183969"/>
+            <a:ext cx="1799275" cy="369332"/>
           </a:xfrm>
           <a:prstGeom prst="rect">
             <a:avLst/>
@@ -14280,45 +14126,31 @@
           <a:p>
             <a:pPr algn="ctr"/>
             <a:r>
-              <a:rPr lang="en-US" altLang="ko-KR" sz="1000">
-                <a:solidFill>
-                  <a:schemeClr val="tx1">
-                    <a:lumMod val="50000"/>
-                    <a:lumOff val="50000"/>
-                  </a:schemeClr>
-                </a:solidFill>
-              </a:rPr>
-              <a:t>Size : image_count</a:t>
-            </a:r>
-            <a:endParaRPr lang="ko-KR" altLang="en-US" sz="1000">
-              <a:solidFill>
-                <a:schemeClr val="tx1">
-                  <a:lumMod val="50000"/>
-                  <a:lumOff val="50000"/>
-                </a:schemeClr>
-              </a:solidFill>
-            </a:endParaRPr>
+              <a:rPr lang="en-US" altLang="ko-KR"/>
+              <a:t>Image + layout</a:t>
+            </a:r>
+            <a:endParaRPr lang="ko-KR" altLang="en-US"/>
           </a:p>
         </p:txBody>
       </p:sp>
       <p:cxnSp>
         <p:nvCxnSpPr>
-          <p:cNvPr id="80" name="직선 화살표 연결선 79">
-            <a:extLst>
-              <a:ext uri="{FF2B5EF4-FFF2-40B4-BE49-F238E27FC236}">
-                <a16:creationId xmlns:a16="http://schemas.microsoft.com/office/drawing/2014/main" id="{C13471B3-B2E6-4EA5-A21F-C899F88D9643}"/>
+          <p:cNvPr id="6" name="직선 화살표 연결선 5">
+            <a:extLst>
+              <a:ext uri="{FF2B5EF4-FFF2-40B4-BE49-F238E27FC236}">
+                <a16:creationId xmlns:a16="http://schemas.microsoft.com/office/drawing/2014/main" id="{E78876AE-A287-4A24-922E-F85C90C104FB}"/>
               </a:ext>
             </a:extLst>
           </p:cNvPr>
           <p:cNvCxnSpPr>
-            <a:cxnSpLocks/>
+            <a:stCxn id="15" idx="1"/>
           </p:cNvCxnSpPr>
           <p:nvPr/>
         </p:nvCxnSpPr>
         <p:spPr>
-          <a:xfrm flipH="1">
-            <a:off x="2115424" y="1861366"/>
-            <a:ext cx="1332757" cy="0"/>
+          <a:xfrm flipV="1">
+            <a:off x="2899957" y="2553299"/>
+            <a:ext cx="2586443" cy="875701"/>
           </a:xfrm>
           <a:prstGeom prst="straightConnector1">
             <a:avLst/>
@@ -14348,12 +14180,108 @@
           </a:fontRef>
         </p:style>
       </p:cxnSp>
-      <p:sp>
-        <p:nvSpPr>
-          <p:cNvPr id="82" name="TextBox 81">
-            <a:extLst>
-              <a:ext uri="{FF2B5EF4-FFF2-40B4-BE49-F238E27FC236}">
-                <a16:creationId xmlns:a16="http://schemas.microsoft.com/office/drawing/2014/main" id="{69518618-6388-487C-AAFF-B506957C061B}"/>
+      <p:cxnSp>
+        <p:nvCxnSpPr>
+          <p:cNvPr id="22" name="직선 화살표 연결선 21">
+            <a:extLst>
+              <a:ext uri="{FF2B5EF4-FFF2-40B4-BE49-F238E27FC236}">
+                <a16:creationId xmlns:a16="http://schemas.microsoft.com/office/drawing/2014/main" id="{06C154DB-76E6-454D-9307-987008DE4703}"/>
+              </a:ext>
+            </a:extLst>
+          </p:cNvPr>
+          <p:cNvCxnSpPr>
+            <a:cxnSpLocks/>
+            <a:stCxn id="15" idx="1"/>
+          </p:cNvCxnSpPr>
+          <p:nvPr/>
+        </p:nvCxnSpPr>
+        <p:spPr>
+          <a:xfrm>
+            <a:off x="2899957" y="3429000"/>
+            <a:ext cx="2586443" cy="0"/>
+          </a:xfrm>
+          <a:prstGeom prst="straightConnector1">
+            <a:avLst/>
+          </a:prstGeom>
+          <a:ln w="25400">
+            <a:solidFill>
+              <a:schemeClr val="tx1">
+                <a:lumMod val="50000"/>
+                <a:lumOff val="50000"/>
+              </a:schemeClr>
+            </a:solidFill>
+            <a:tailEnd type="triangle"/>
+          </a:ln>
+        </p:spPr>
+        <p:style>
+          <a:lnRef idx="1">
+            <a:schemeClr val="accent1"/>
+          </a:lnRef>
+          <a:fillRef idx="0">
+            <a:schemeClr val="accent1"/>
+          </a:fillRef>
+          <a:effectRef idx="0">
+            <a:schemeClr val="accent1"/>
+          </a:effectRef>
+          <a:fontRef idx="minor">
+            <a:schemeClr val="tx1"/>
+          </a:fontRef>
+        </p:style>
+      </p:cxnSp>
+      <p:cxnSp>
+        <p:nvCxnSpPr>
+          <p:cNvPr id="34" name="직선 화살표 연결선 33">
+            <a:extLst>
+              <a:ext uri="{FF2B5EF4-FFF2-40B4-BE49-F238E27FC236}">
+                <a16:creationId xmlns:a16="http://schemas.microsoft.com/office/drawing/2014/main" id="{BCB4D184-5212-48CE-80B5-D486BB037EE4}"/>
+              </a:ext>
+            </a:extLst>
+          </p:cNvPr>
+          <p:cNvCxnSpPr>
+            <a:cxnSpLocks/>
+            <a:stCxn id="15" idx="1"/>
+          </p:cNvCxnSpPr>
+          <p:nvPr/>
+        </p:nvCxnSpPr>
+        <p:spPr>
+          <a:xfrm>
+            <a:off x="2899957" y="3429000"/>
+            <a:ext cx="2586443" cy="875701"/>
+          </a:xfrm>
+          <a:prstGeom prst="straightConnector1">
+            <a:avLst/>
+          </a:prstGeom>
+          <a:ln w="25400">
+            <a:solidFill>
+              <a:schemeClr val="tx1">
+                <a:lumMod val="50000"/>
+                <a:lumOff val="50000"/>
+              </a:schemeClr>
+            </a:solidFill>
+            <a:tailEnd type="triangle"/>
+          </a:ln>
+        </p:spPr>
+        <p:style>
+          <a:lnRef idx="1">
+            <a:schemeClr val="accent1"/>
+          </a:lnRef>
+          <a:fillRef idx="0">
+            <a:schemeClr val="accent1"/>
+          </a:fillRef>
+          <a:effectRef idx="0">
+            <a:schemeClr val="accent1"/>
+          </a:effectRef>
+          <a:fontRef idx="minor">
+            <a:schemeClr val="tx1"/>
+          </a:fontRef>
+        </p:style>
+      </p:cxnSp>
+      <p:sp>
+        <p:nvSpPr>
+          <p:cNvPr id="35" name="TextBox 34">
+            <a:extLst>
+              <a:ext uri="{FF2B5EF4-FFF2-40B4-BE49-F238E27FC236}">
+                <a16:creationId xmlns:a16="http://schemas.microsoft.com/office/drawing/2014/main" id="{49BD7FF7-2F65-410E-AADC-CA31C33D1CC7}"/>
               </a:ext>
             </a:extLst>
           </p:cNvPr>
@@ -14362,8 +14290,8 @@
         </p:nvSpPr>
         <p:spPr>
           <a:xfrm>
-            <a:off x="2464247" y="1602978"/>
-            <a:ext cx="635110" cy="246221"/>
+            <a:off x="3540042" y="2261067"/>
+            <a:ext cx="1560364" cy="461665"/>
           </a:xfrm>
           <a:prstGeom prst="rect">
             <a:avLst/>
@@ -14372,6 +14300,265 @@
         </p:spPr>
         <p:txBody>
           <a:bodyPr wrap="none" rtlCol="0">
+            <a:spAutoFit/>
+          </a:bodyPr>
+          <a:lstStyle/>
+          <a:p>
+            <a:pPr algn="ctr"/>
+            <a:r>
+              <a:rPr lang="en-US" altLang="ko-KR" sz="1200"/>
+              <a:t>selected depending</a:t>
+            </a:r>
+          </a:p>
+          <a:p>
+            <a:pPr algn="ctr"/>
+            <a:r>
+              <a:rPr lang="en-US" altLang="ko-KR" sz="1200"/>
+              <a:t>on layout</a:t>
+            </a:r>
+            <a:endParaRPr lang="ko-KR" altLang="en-US" sz="1200"/>
+          </a:p>
+        </p:txBody>
+      </p:sp>
+      <p:sp>
+        <p:nvSpPr>
+          <p:cNvPr id="37" name="TextBox 36">
+            <a:extLst>
+              <a:ext uri="{FF2B5EF4-FFF2-40B4-BE49-F238E27FC236}">
+                <a16:creationId xmlns:a16="http://schemas.microsoft.com/office/drawing/2014/main" id="{718D5383-3EAE-40F1-86EA-B1F08C9EC541}"/>
+              </a:ext>
+            </a:extLst>
+          </p:cNvPr>
+          <p:cNvSpPr txBox="1"/>
+          <p:nvPr/>
+        </p:nvSpPr>
+        <p:spPr>
+          <a:xfrm>
+            <a:off x="2432811" y="3290499"/>
+            <a:ext cx="487057" cy="276999"/>
+          </a:xfrm>
+          <a:prstGeom prst="rect">
+            <a:avLst/>
+          </a:prstGeom>
+          <a:noFill/>
+        </p:spPr>
+        <p:txBody>
+          <a:bodyPr wrap="none" rtlCol="0">
+            <a:spAutoFit/>
+          </a:bodyPr>
+          <a:lstStyle/>
+          <a:p>
+            <a:pPr algn="ctr"/>
+            <a:r>
+              <a:rPr lang="en-US" altLang="ko-KR" sz="1200"/>
+              <a:t>load</a:t>
+            </a:r>
+            <a:endParaRPr lang="ko-KR" altLang="en-US" sz="1200"/>
+          </a:p>
+        </p:txBody>
+      </p:sp>
+      <p:sp>
+        <p:nvSpPr>
+          <p:cNvPr id="38" name="TextBox 37">
+            <a:extLst>
+              <a:ext uri="{FF2B5EF4-FFF2-40B4-BE49-F238E27FC236}">
+                <a16:creationId xmlns:a16="http://schemas.microsoft.com/office/drawing/2014/main" id="{FAEE1250-9E13-4168-BA47-8210E0FAFA65}"/>
+              </a:ext>
+            </a:extLst>
+          </p:cNvPr>
+          <p:cNvSpPr txBox="1"/>
+          <p:nvPr/>
+        </p:nvSpPr>
+        <p:spPr>
+          <a:xfrm>
+            <a:off x="9250331" y="3290499"/>
+            <a:ext cx="530658" cy="276999"/>
+          </a:xfrm>
+          <a:prstGeom prst="rect">
+            <a:avLst/>
+          </a:prstGeom>
+          <a:noFill/>
+        </p:spPr>
+        <p:txBody>
+          <a:bodyPr wrap="none" rtlCol="0">
+            <a:spAutoFit/>
+          </a:bodyPr>
+          <a:lstStyle/>
+          <a:p>
+            <a:pPr algn="ctr"/>
+            <a:r>
+              <a:rPr lang="en-US" altLang="ko-KR" sz="1200"/>
+              <a:t>store</a:t>
+            </a:r>
+            <a:endParaRPr lang="ko-KR" altLang="en-US" sz="1200"/>
+          </a:p>
+        </p:txBody>
+      </p:sp>
+      <p:cxnSp>
+        <p:nvCxnSpPr>
+          <p:cNvPr id="40" name="직선 화살표 연결선 39">
+            <a:extLst>
+              <a:ext uri="{FF2B5EF4-FFF2-40B4-BE49-F238E27FC236}">
+                <a16:creationId xmlns:a16="http://schemas.microsoft.com/office/drawing/2014/main" id="{C3621A42-3292-490F-BC88-A9D062F1D9B4}"/>
+              </a:ext>
+            </a:extLst>
+          </p:cNvPr>
+          <p:cNvCxnSpPr>
+            <a:cxnSpLocks/>
+            <a:endCxn id="38" idx="1"/>
+          </p:cNvCxnSpPr>
+          <p:nvPr/>
+        </p:nvCxnSpPr>
+        <p:spPr>
+          <a:xfrm flipV="1">
+            <a:off x="6705599" y="3428999"/>
+            <a:ext cx="2544732" cy="2"/>
+          </a:xfrm>
+          <a:prstGeom prst="straightConnector1">
+            <a:avLst/>
+          </a:prstGeom>
+          <a:ln w="25400">
+            <a:solidFill>
+              <a:schemeClr val="tx1">
+                <a:lumMod val="50000"/>
+                <a:lumOff val="50000"/>
+              </a:schemeClr>
+            </a:solidFill>
+            <a:tailEnd type="triangle"/>
+          </a:ln>
+        </p:spPr>
+        <p:style>
+          <a:lnRef idx="1">
+            <a:schemeClr val="accent1"/>
+          </a:lnRef>
+          <a:fillRef idx="0">
+            <a:schemeClr val="accent1"/>
+          </a:fillRef>
+          <a:effectRef idx="0">
+            <a:schemeClr val="accent1"/>
+          </a:effectRef>
+          <a:fontRef idx="minor">
+            <a:schemeClr val="tx1"/>
+          </a:fontRef>
+        </p:style>
+      </p:cxnSp>
+      <p:cxnSp>
+        <p:nvCxnSpPr>
+          <p:cNvPr id="41" name="직선 화살표 연결선 40">
+            <a:extLst>
+              <a:ext uri="{FF2B5EF4-FFF2-40B4-BE49-F238E27FC236}">
+                <a16:creationId xmlns:a16="http://schemas.microsoft.com/office/drawing/2014/main" id="{B78202C7-03BE-4CB7-BE0E-CDCD053782E1}"/>
+              </a:ext>
+            </a:extLst>
+          </p:cNvPr>
+          <p:cNvCxnSpPr>
+            <a:cxnSpLocks/>
+          </p:cNvCxnSpPr>
+          <p:nvPr/>
+        </p:nvCxnSpPr>
+        <p:spPr>
+          <a:xfrm flipV="1">
+            <a:off x="6705599" y="3429001"/>
+            <a:ext cx="2542669" cy="875700"/>
+          </a:xfrm>
+          <a:prstGeom prst="straightConnector1">
+            <a:avLst/>
+          </a:prstGeom>
+          <a:ln w="25400">
+            <a:solidFill>
+              <a:schemeClr val="tx1">
+                <a:lumMod val="50000"/>
+                <a:lumOff val="50000"/>
+              </a:schemeClr>
+            </a:solidFill>
+            <a:tailEnd type="triangle"/>
+          </a:ln>
+        </p:spPr>
+        <p:style>
+          <a:lnRef idx="1">
+            <a:schemeClr val="accent1"/>
+          </a:lnRef>
+          <a:fillRef idx="0">
+            <a:schemeClr val="accent1"/>
+          </a:fillRef>
+          <a:effectRef idx="0">
+            <a:schemeClr val="accent1"/>
+          </a:effectRef>
+          <a:fontRef idx="minor">
+            <a:schemeClr val="tx1"/>
+          </a:fontRef>
+        </p:style>
+      </p:cxnSp>
+      <p:cxnSp>
+        <p:nvCxnSpPr>
+          <p:cNvPr id="42" name="직선 화살표 연결선 41">
+            <a:extLst>
+              <a:ext uri="{FF2B5EF4-FFF2-40B4-BE49-F238E27FC236}">
+                <a16:creationId xmlns:a16="http://schemas.microsoft.com/office/drawing/2014/main" id="{9DCF2797-B807-40B8-8DC3-D7538E8BA406}"/>
+              </a:ext>
+            </a:extLst>
+          </p:cNvPr>
+          <p:cNvCxnSpPr>
+            <a:cxnSpLocks/>
+          </p:cNvCxnSpPr>
+          <p:nvPr/>
+        </p:nvCxnSpPr>
+        <p:spPr>
+          <a:xfrm>
+            <a:off x="6705599" y="2553296"/>
+            <a:ext cx="2542669" cy="863989"/>
+          </a:xfrm>
+          <a:prstGeom prst="straightConnector1">
+            <a:avLst/>
+          </a:prstGeom>
+          <a:ln w="25400">
+            <a:solidFill>
+              <a:schemeClr val="tx1">
+                <a:lumMod val="50000"/>
+                <a:lumOff val="50000"/>
+              </a:schemeClr>
+            </a:solidFill>
+            <a:tailEnd type="triangle"/>
+          </a:ln>
+        </p:spPr>
+        <p:style>
+          <a:lnRef idx="1">
+            <a:schemeClr val="accent1"/>
+          </a:lnRef>
+          <a:fillRef idx="0">
+            <a:schemeClr val="accent1"/>
+          </a:fillRef>
+          <a:effectRef idx="0">
+            <a:schemeClr val="accent1"/>
+          </a:effectRef>
+          <a:fontRef idx="minor">
+            <a:schemeClr val="tx1"/>
+          </a:fontRef>
+        </p:style>
+      </p:cxnSp>
+      <p:sp>
+        <p:nvSpPr>
+          <p:cNvPr id="43" name="직사각형 42">
+            <a:extLst>
+              <a:ext uri="{FF2B5EF4-FFF2-40B4-BE49-F238E27FC236}">
+                <a16:creationId xmlns:a16="http://schemas.microsoft.com/office/drawing/2014/main" id="{1AD66019-55C7-4F4C-AF9F-54D504B0073B}"/>
+              </a:ext>
+            </a:extLst>
+          </p:cNvPr>
+          <p:cNvSpPr/>
+          <p:nvPr/>
+        </p:nvSpPr>
+        <p:spPr>
+          <a:xfrm>
+            <a:off x="3655108" y="5564138"/>
+            <a:ext cx="4881782" cy="246221"/>
+          </a:xfrm>
+          <a:prstGeom prst="rect">
+            <a:avLst/>
+          </a:prstGeom>
+        </p:spPr>
+        <p:txBody>
+          <a:bodyPr wrap="square">
             <a:spAutoFit/>
           </a:bodyPr>
           <a:lstStyle/>
@@ -14386,25 +14573,17 @@
                   </a:schemeClr>
                 </a:solidFill>
               </a:rPr>
-              <a:t>allocate</a:t>
-            </a:r>
-            <a:endParaRPr lang="ko-KR" altLang="en-US" sz="1000">
-              <a:solidFill>
-                <a:schemeClr val="tx1">
-                  <a:lumMod val="50000"/>
-                  <a:lumOff val="50000"/>
-                </a:schemeClr>
-              </a:solidFill>
-            </a:endParaRPr>
-          </a:p>
-        </p:txBody>
-      </p:sp>
-      <p:sp>
-        <p:nvSpPr>
-          <p:cNvPr id="14" name="TextBox 13">
-            <a:extLst>
-              <a:ext uri="{FF2B5EF4-FFF2-40B4-BE49-F238E27FC236}">
-                <a16:creationId xmlns:a16="http://schemas.microsoft.com/office/drawing/2014/main" id="{BE563C21-2BF4-429D-8233-9452117BC3B2}"/>
+              <a:t>* RenderPass and SubPass have their own attachments.</a:t>
+            </a:r>
+          </a:p>
+        </p:txBody>
+      </p:sp>
+      <p:sp>
+        <p:nvSpPr>
+          <p:cNvPr id="44" name="TextBox 43">
+            <a:extLst>
+              <a:ext uri="{FF2B5EF4-FFF2-40B4-BE49-F238E27FC236}">
+                <a16:creationId xmlns:a16="http://schemas.microsoft.com/office/drawing/2014/main" id="{A49344EC-342B-4FED-A89E-2E63E04B3D3C}"/>
               </a:ext>
             </a:extLst>
           </p:cNvPr>
@@ -14413,8 +14592,8 @@
         </p:nvSpPr>
         <p:spPr>
           <a:xfrm>
-            <a:off x="6856688" y="601112"/>
-            <a:ext cx="3017173" cy="430887"/>
+            <a:off x="285065" y="3229101"/>
+            <a:ext cx="1689886" cy="369332"/>
           </a:xfrm>
           <a:prstGeom prst="rect">
             <a:avLst/>
@@ -14427,8 +14606,94 @@
           </a:bodyPr>
           <a:lstStyle/>
           <a:p>
-            <a:r>
-              <a:rPr lang="en-US" altLang="ko-KR" sz="1100">
+            <a:pPr algn="ctr"/>
+            <a:r>
+              <a:rPr lang="en-US" altLang="ko-KR"/>
+              <a:t>FrameBuffer(s)</a:t>
+            </a:r>
+            <a:endParaRPr lang="ko-KR" altLang="en-US"/>
+          </a:p>
+        </p:txBody>
+      </p:sp>
+      <p:cxnSp>
+        <p:nvCxnSpPr>
+          <p:cNvPr id="45" name="직선 화살표 연결선 44">
+            <a:extLst>
+              <a:ext uri="{FF2B5EF4-FFF2-40B4-BE49-F238E27FC236}">
+                <a16:creationId xmlns:a16="http://schemas.microsoft.com/office/drawing/2014/main" id="{812DF91F-BA33-4EF4-9E41-D5922D7A2883}"/>
+              </a:ext>
+            </a:extLst>
+          </p:cNvPr>
+          <p:cNvCxnSpPr>
+            <a:cxnSpLocks/>
+            <a:stCxn id="44" idx="0"/>
+            <a:endCxn id="4" idx="2"/>
+          </p:cNvCxnSpPr>
+          <p:nvPr/>
+        </p:nvCxnSpPr>
+        <p:spPr>
+          <a:xfrm flipV="1">
+            <a:off x="1130008" y="2553301"/>
+            <a:ext cx="5855" cy="675800"/>
+          </a:xfrm>
+          <a:prstGeom prst="straightConnector1">
+            <a:avLst/>
+          </a:prstGeom>
+          <a:ln w="25400">
+            <a:solidFill>
+              <a:schemeClr val="tx1">
+                <a:lumMod val="50000"/>
+                <a:lumOff val="50000"/>
+              </a:schemeClr>
+            </a:solidFill>
+            <a:tailEnd type="triangle"/>
+          </a:ln>
+        </p:spPr>
+        <p:style>
+          <a:lnRef idx="1">
+            <a:schemeClr val="accent1"/>
+          </a:lnRef>
+          <a:fillRef idx="0">
+            <a:schemeClr val="accent1"/>
+          </a:fillRef>
+          <a:effectRef idx="0">
+            <a:schemeClr val="accent1"/>
+          </a:effectRef>
+          <a:fontRef idx="minor">
+            <a:schemeClr val="tx1"/>
+          </a:fontRef>
+        </p:style>
+      </p:cxnSp>
+      <p:sp>
+        <p:nvSpPr>
+          <p:cNvPr id="46" name="직사각형 45">
+            <a:extLst>
+              <a:ext uri="{FF2B5EF4-FFF2-40B4-BE49-F238E27FC236}">
+                <a16:creationId xmlns:a16="http://schemas.microsoft.com/office/drawing/2014/main" id="{2F375110-5DE1-4927-93A8-CB7F87BD7674}"/>
+              </a:ext>
+            </a:extLst>
+          </p:cNvPr>
+          <p:cNvSpPr/>
+          <p:nvPr/>
+        </p:nvSpPr>
+        <p:spPr>
+          <a:xfrm>
+            <a:off x="1130008" y="2736658"/>
+            <a:ext cx="847660" cy="246221"/>
+          </a:xfrm>
+          <a:prstGeom prst="rect">
+            <a:avLst/>
+          </a:prstGeom>
+        </p:spPr>
+        <p:txBody>
+          <a:bodyPr wrap="square">
+            <a:spAutoFit/>
+          </a:bodyPr>
+          <a:lstStyle/>
+          <a:p>
+            <a:pPr algn="ctr"/>
+            <a:r>
+              <a:rPr lang="en-US" altLang="ko-KR" sz="1000">
                 <a:solidFill>
                   <a:schemeClr val="tx1">
                     <a:lumMod val="50000"/>
@@ -14436,756 +14701,63 @@
                   </a:schemeClr>
                 </a:solidFill>
               </a:rPr>
-              <a:t>Image_count</a:t>
-            </a:r>
-            <a:r>
-              <a:rPr lang="ko-KR" altLang="en-US" sz="1100">
-                <a:solidFill>
-                  <a:schemeClr val="tx1">
-                    <a:lumMod val="50000"/>
-                    <a:lumOff val="50000"/>
-                  </a:schemeClr>
-                </a:solidFill>
-              </a:rPr>
-              <a:t>만큼 </a:t>
-            </a:r>
-            <a:r>
-              <a:rPr lang="en-US" altLang="ko-KR" sz="1100">
-                <a:solidFill>
-                  <a:schemeClr val="tx1">
-                    <a:lumMod val="50000"/>
-                    <a:lumOff val="50000"/>
-                  </a:schemeClr>
-                </a:solidFill>
-              </a:rPr>
-              <a:t>VkImage</a:t>
-            </a:r>
-            <a:r>
-              <a:rPr lang="ko-KR" altLang="en-US" sz="1100">
-                <a:solidFill>
-                  <a:schemeClr val="tx1">
-                    <a:lumMod val="50000"/>
-                    <a:lumOff val="50000"/>
-                  </a:schemeClr>
-                </a:solidFill>
-              </a:rPr>
-              <a:t>만듦</a:t>
-            </a:r>
-            <a:endParaRPr lang="en-US" altLang="ko-KR" sz="1100">
-              <a:solidFill>
-                <a:schemeClr val="tx1">
-                  <a:lumMod val="50000"/>
-                  <a:lumOff val="50000"/>
-                </a:schemeClr>
-              </a:solidFill>
-            </a:endParaRPr>
-          </a:p>
-          <a:p>
-            <a:r>
-              <a:rPr lang="en-US" altLang="ko-KR" sz="1100">
-                <a:solidFill>
-                  <a:schemeClr val="tx1">
-                    <a:lumMod val="50000"/>
-                    <a:lumOff val="50000"/>
-                  </a:schemeClr>
-                </a:solidFill>
-              </a:rPr>
-              <a:t>Swapchain</a:t>
-            </a:r>
-            <a:r>
-              <a:rPr lang="ko-KR" altLang="en-US" sz="1100">
-                <a:solidFill>
-                  <a:schemeClr val="tx1">
-                    <a:lumMod val="50000"/>
-                    <a:lumOff val="50000"/>
-                  </a:schemeClr>
-                </a:solidFill>
-              </a:rPr>
-              <a:t>에서 </a:t>
-            </a:r>
-            <a:r>
-              <a:rPr lang="en-US" altLang="ko-KR" sz="1100">
-                <a:solidFill>
-                  <a:schemeClr val="tx1">
-                    <a:lumMod val="50000"/>
-                    <a:lumOff val="50000"/>
-                  </a:schemeClr>
-                </a:solidFill>
-              </a:rPr>
-              <a:t>image handle</a:t>
-            </a:r>
-            <a:r>
-              <a:rPr lang="ko-KR" altLang="en-US" sz="1100">
-                <a:solidFill>
-                  <a:schemeClr val="tx1">
-                    <a:lumMod val="50000"/>
-                    <a:lumOff val="50000"/>
-                  </a:schemeClr>
-                </a:solidFill>
-              </a:rPr>
-              <a:t>을 가져와 저장</a:t>
-            </a:r>
-            <a:endParaRPr lang="en-US" altLang="ko-KR" sz="1100">
-              <a:solidFill>
-                <a:schemeClr val="tx1">
-                  <a:lumMod val="50000"/>
-                  <a:lumOff val="50000"/>
-                </a:schemeClr>
-              </a:solidFill>
-            </a:endParaRPr>
-          </a:p>
-        </p:txBody>
-      </p:sp>
-      <p:sp>
-        <p:nvSpPr>
-          <p:cNvPr id="3" name="직사각형 2">
-            <a:extLst>
-              <a:ext uri="{FF2B5EF4-FFF2-40B4-BE49-F238E27FC236}">
-                <a16:creationId xmlns:a16="http://schemas.microsoft.com/office/drawing/2014/main" id="{C359C448-5C9E-4F86-B9C6-D1E796012252}"/>
-              </a:ext>
-            </a:extLst>
-          </p:cNvPr>
-          <p:cNvSpPr/>
-          <p:nvPr/>
-        </p:nvSpPr>
-        <p:spPr>
-          <a:xfrm>
-            <a:off x="2323104" y="2076809"/>
-            <a:ext cx="3727839" cy="246221"/>
-          </a:xfrm>
-          <a:prstGeom prst="rect">
+              <a:t>image view</a:t>
+            </a:r>
+          </a:p>
+        </p:txBody>
+      </p:sp>
+      <p:cxnSp>
+        <p:nvCxnSpPr>
+          <p:cNvPr id="47" name="직선 화살표 연결선 46">
+            <a:extLst>
+              <a:ext uri="{FF2B5EF4-FFF2-40B4-BE49-F238E27FC236}">
+                <a16:creationId xmlns:a16="http://schemas.microsoft.com/office/drawing/2014/main" id="{A42DACF4-C200-4BDC-8657-5102215F3079}"/>
+              </a:ext>
+            </a:extLst>
+          </p:cNvPr>
+          <p:cNvCxnSpPr>
+            <a:cxnSpLocks/>
+            <a:endCxn id="37" idx="1"/>
+          </p:cNvCxnSpPr>
+          <p:nvPr/>
+        </p:nvCxnSpPr>
+        <p:spPr>
+          <a:xfrm flipV="1">
+            <a:off x="1974951" y="3428999"/>
+            <a:ext cx="457860" cy="2"/>
+          </a:xfrm>
+          <a:prstGeom prst="straightConnector1">
             <a:avLst/>
           </a:prstGeom>
-        </p:spPr>
-        <p:txBody>
-          <a:bodyPr wrap="square">
-            <a:spAutoFit/>
-          </a:bodyPr>
-          <a:lstStyle/>
-          <a:p>
-            <a:pPr algn="ctr"/>
-            <a:r>
-              <a:rPr lang="en-US" altLang="ko-KR" sz="1000">
-                <a:solidFill>
-                  <a:schemeClr val="tx1">
-                    <a:lumMod val="50000"/>
-                    <a:lumOff val="50000"/>
-                  </a:schemeClr>
-                </a:solidFill>
-                <a:ea typeface="돋움체" panose="020B0609000101010101" pitchFamily="49" charset="-127"/>
-              </a:rPr>
-              <a:t>VK_COMMAND_BUFFER_USAGE_SIMULTANEOUS_USE_BIT</a:t>
-            </a:r>
-            <a:endParaRPr lang="en-US" altLang="ko-KR" sz="1000">
-              <a:solidFill>
-                <a:schemeClr val="tx1">
-                  <a:lumMod val="50000"/>
-                  <a:lumOff val="50000"/>
-                </a:schemeClr>
-              </a:solidFill>
-            </a:endParaRPr>
-          </a:p>
-        </p:txBody>
-      </p:sp>
-      <p:sp>
-        <p:nvSpPr>
-          <p:cNvPr id="16" name="직사각형 15">
-            <a:extLst>
-              <a:ext uri="{FF2B5EF4-FFF2-40B4-BE49-F238E27FC236}">
-                <a16:creationId xmlns:a16="http://schemas.microsoft.com/office/drawing/2014/main" id="{3AA9C2B5-0317-472E-965E-20AFCFC9F18C}"/>
-              </a:ext>
-            </a:extLst>
-          </p:cNvPr>
-          <p:cNvSpPr/>
-          <p:nvPr/>
-        </p:nvSpPr>
-        <p:spPr>
-          <a:xfrm>
-            <a:off x="384635" y="2766393"/>
-            <a:ext cx="3727839" cy="246221"/>
-          </a:xfrm>
-          <a:prstGeom prst="rect">
-            <a:avLst/>
-          </a:prstGeom>
-        </p:spPr>
-        <p:txBody>
-          <a:bodyPr wrap="square">
-            <a:spAutoFit/>
-          </a:bodyPr>
-          <a:lstStyle/>
-          <a:p>
-            <a:pPr algn="ctr"/>
-            <a:r>
-              <a:rPr lang="en-US" altLang="ko-KR" sz="1000">
-                <a:solidFill>
-                  <a:schemeClr val="tx1">
-                    <a:lumMod val="50000"/>
-                    <a:lumOff val="50000"/>
-                  </a:schemeClr>
-                </a:solidFill>
-                <a:ea typeface="돋움체" panose="020B0609000101010101" pitchFamily="49" charset="-127"/>
-              </a:rPr>
-              <a:t>Primary,</a:t>
-            </a:r>
-            <a:r>
-              <a:rPr lang="ko-KR" altLang="en-US" sz="1000">
-                <a:solidFill>
-                  <a:schemeClr val="tx1">
-                    <a:lumMod val="50000"/>
-                    <a:lumOff val="50000"/>
-                  </a:schemeClr>
-                </a:solidFill>
-                <a:ea typeface="돋움체" panose="020B0609000101010101" pitchFamily="49" charset="-127"/>
-              </a:rPr>
-              <a:t> </a:t>
-            </a:r>
-            <a:r>
-              <a:rPr lang="en-US" altLang="ko-KR" sz="1000">
-                <a:solidFill>
-                  <a:schemeClr val="tx1">
-                    <a:lumMod val="50000"/>
-                    <a:lumOff val="50000"/>
-                  </a:schemeClr>
-                </a:solidFill>
-                <a:ea typeface="돋움체" panose="020B0609000101010101" pitchFamily="49" charset="-127"/>
-              </a:rPr>
-              <a:t>Secondary Command</a:t>
-            </a:r>
-            <a:endParaRPr lang="en-US" altLang="ko-KR" sz="1000">
-              <a:solidFill>
-                <a:schemeClr val="tx1">
-                  <a:lumMod val="50000"/>
-                  <a:lumOff val="50000"/>
-                </a:schemeClr>
-              </a:solidFill>
-            </a:endParaRPr>
-          </a:p>
-        </p:txBody>
-      </p:sp>
-      <p:sp>
-        <p:nvSpPr>
-          <p:cNvPr id="17" name="직사각형 16">
-            <a:extLst>
-              <a:ext uri="{FF2B5EF4-FFF2-40B4-BE49-F238E27FC236}">
-                <a16:creationId xmlns:a16="http://schemas.microsoft.com/office/drawing/2014/main" id="{2E645339-CE11-4CB0-B194-D3AA6C8F211B}"/>
-              </a:ext>
-            </a:extLst>
-          </p:cNvPr>
-          <p:cNvSpPr/>
-          <p:nvPr/>
-        </p:nvSpPr>
-        <p:spPr>
-          <a:xfrm>
-            <a:off x="6856688" y="1134692"/>
-            <a:ext cx="3727839" cy="246221"/>
-          </a:xfrm>
-          <a:prstGeom prst="rect">
-            <a:avLst/>
-          </a:prstGeom>
-        </p:spPr>
-        <p:txBody>
-          <a:bodyPr wrap="square">
-            <a:spAutoFit/>
-          </a:bodyPr>
-          <a:lstStyle/>
-          <a:p>
-            <a:r>
-              <a:rPr lang="en-US" altLang="ko-KR" sz="1000">
-                <a:solidFill>
-                  <a:schemeClr val="tx1">
-                    <a:lumMod val="50000"/>
-                    <a:lumOff val="50000"/>
-                  </a:schemeClr>
-                </a:solidFill>
-              </a:rPr>
-              <a:t>Image_subresource = </a:t>
-            </a:r>
-            <a:r>
-              <a:rPr lang="ko-KR" altLang="en-US" sz="1000">
-                <a:solidFill>
-                  <a:schemeClr val="tx1">
-                    <a:lumMod val="50000"/>
-                    <a:lumOff val="50000"/>
-                  </a:schemeClr>
-                </a:solidFill>
-              </a:rPr>
-              <a:t>이미지 설정 </a:t>
-            </a:r>
-            <a:r>
-              <a:rPr lang="en-US" altLang="ko-KR" sz="1000">
-                <a:solidFill>
-                  <a:schemeClr val="tx1">
-                    <a:lumMod val="50000"/>
-                    <a:lumOff val="50000"/>
-                  </a:schemeClr>
-                </a:solidFill>
-              </a:rPr>
-              <a:t>(</a:t>
-            </a:r>
-            <a:r>
-              <a:rPr lang="ko-KR" altLang="en-US" sz="1000">
-                <a:solidFill>
-                  <a:schemeClr val="tx1">
-                    <a:lumMod val="50000"/>
-                    <a:lumOff val="50000"/>
-                  </a:schemeClr>
-                </a:solidFill>
-              </a:rPr>
-              <a:t>밈맵</a:t>
-            </a:r>
-            <a:r>
-              <a:rPr lang="en-US" altLang="ko-KR" sz="1000">
-                <a:solidFill>
-                  <a:schemeClr val="tx1">
-                    <a:lumMod val="50000"/>
-                    <a:lumOff val="50000"/>
-                  </a:schemeClr>
-                </a:solidFill>
-              </a:rPr>
-              <a:t>, </a:t>
-            </a:r>
-            <a:r>
-              <a:rPr lang="ko-KR" altLang="en-US" sz="1000">
-                <a:solidFill>
-                  <a:schemeClr val="tx1">
-                    <a:lumMod val="50000"/>
-                    <a:lumOff val="50000"/>
-                  </a:schemeClr>
-                </a:solidFill>
-              </a:rPr>
-              <a:t>레이어 등등</a:t>
-            </a:r>
-            <a:r>
-              <a:rPr lang="en-US" altLang="ko-KR" sz="1000">
-                <a:solidFill>
-                  <a:schemeClr val="tx1">
-                    <a:lumMod val="50000"/>
-                    <a:lumOff val="50000"/>
-                  </a:schemeClr>
-                </a:solidFill>
-              </a:rPr>
-              <a:t>)</a:t>
-            </a:r>
-          </a:p>
-        </p:txBody>
-      </p:sp>
-      <p:sp>
-        <p:nvSpPr>
-          <p:cNvPr id="18" name="직사각형 17">
-            <a:extLst>
-              <a:ext uri="{FF2B5EF4-FFF2-40B4-BE49-F238E27FC236}">
-                <a16:creationId xmlns:a16="http://schemas.microsoft.com/office/drawing/2014/main" id="{8AA32219-8DDF-4E3A-AE06-5B4B2553DA1A}"/>
-              </a:ext>
-            </a:extLst>
-          </p:cNvPr>
-          <p:cNvSpPr/>
-          <p:nvPr/>
-        </p:nvSpPr>
-        <p:spPr>
-          <a:xfrm>
-            <a:off x="384635" y="2988278"/>
-            <a:ext cx="3727839" cy="246221"/>
-          </a:xfrm>
-          <a:prstGeom prst="rect">
-            <a:avLst/>
-          </a:prstGeom>
-        </p:spPr>
-        <p:txBody>
-          <a:bodyPr wrap="square">
-            <a:spAutoFit/>
-          </a:bodyPr>
-          <a:lstStyle/>
-          <a:p>
-            <a:pPr algn="ctr"/>
-            <a:r>
-              <a:rPr lang="en-US" altLang="ko-KR" sz="1000">
-                <a:solidFill>
-                  <a:schemeClr val="tx1">
-                    <a:lumMod val="50000"/>
-                    <a:lumOff val="50000"/>
-                  </a:schemeClr>
-                </a:solidFill>
-              </a:rPr>
-              <a:t>Resource Transitions</a:t>
-            </a:r>
-          </a:p>
-        </p:txBody>
-      </p:sp>
-      <p:sp>
-        <p:nvSpPr>
-          <p:cNvPr id="19" name="직사각형 18">
-            <a:extLst>
-              <a:ext uri="{FF2B5EF4-FFF2-40B4-BE49-F238E27FC236}">
-                <a16:creationId xmlns:a16="http://schemas.microsoft.com/office/drawing/2014/main" id="{E6F1D93C-A430-421D-85F7-BDAF80A153DB}"/>
-              </a:ext>
-            </a:extLst>
-          </p:cNvPr>
-          <p:cNvSpPr/>
-          <p:nvPr/>
-        </p:nvSpPr>
-        <p:spPr>
-          <a:xfrm>
-            <a:off x="44086" y="3566200"/>
-            <a:ext cx="4881782" cy="1477328"/>
-          </a:xfrm>
-          <a:prstGeom prst="rect">
-            <a:avLst/>
-          </a:prstGeom>
-        </p:spPr>
-        <p:txBody>
-          <a:bodyPr wrap="square">
-            <a:spAutoFit/>
-          </a:bodyPr>
-          <a:lstStyle/>
-          <a:p>
-            <a:pPr algn="ctr"/>
-            <a:r>
-              <a:rPr lang="en-US" altLang="ko-KR" sz="1000">
-                <a:solidFill>
-                  <a:schemeClr val="tx1">
-                    <a:lumMod val="50000"/>
-                    <a:lumOff val="50000"/>
-                  </a:schemeClr>
-                </a:solidFill>
-              </a:rPr>
-              <a:t>Image usage = layout</a:t>
-            </a:r>
-          </a:p>
-          <a:p>
-            <a:pPr algn="ctr"/>
-            <a:endParaRPr lang="en-US" altLang="ko-KR" sz="1000">
-              <a:solidFill>
-                <a:schemeClr val="tx1">
-                  <a:lumMod val="50000"/>
-                  <a:lumOff val="50000"/>
-                </a:schemeClr>
-              </a:solidFill>
-            </a:endParaRPr>
-          </a:p>
-          <a:p>
-            <a:pPr algn="ctr"/>
-            <a:r>
-              <a:rPr lang="en-US" altLang="ko-KR" sz="1000">
-                <a:solidFill>
-                  <a:schemeClr val="tx1">
-                    <a:lumMod val="50000"/>
-                    <a:lumOff val="50000"/>
-                  </a:schemeClr>
-                </a:solidFill>
-              </a:rPr>
-              <a:t>If usage need to change, it needs to shift to other layout</a:t>
-            </a:r>
-          </a:p>
-          <a:p>
-            <a:pPr algn="ctr"/>
-            <a:endParaRPr lang="en-US" altLang="ko-KR" sz="1000">
-              <a:solidFill>
-                <a:schemeClr val="tx1">
-                  <a:lumMod val="50000"/>
-                  <a:lumOff val="50000"/>
-                </a:schemeClr>
-              </a:solidFill>
-            </a:endParaRPr>
-          </a:p>
-          <a:p>
-            <a:pPr algn="ctr"/>
-            <a:r>
-              <a:rPr lang="en-US" altLang="ko-KR" sz="1000">
-                <a:solidFill>
-                  <a:schemeClr val="tx1">
-                    <a:lumMod val="50000"/>
-                    <a:lumOff val="50000"/>
-                  </a:schemeClr>
-                </a:solidFill>
-              </a:rPr>
-              <a:t>Default images are generally in undefined layout</a:t>
-            </a:r>
-          </a:p>
-          <a:p>
-            <a:pPr algn="ctr"/>
-            <a:r>
-              <a:rPr lang="en-US" altLang="ko-KR" sz="1000">
-                <a:solidFill>
-                  <a:schemeClr val="tx1">
-                    <a:lumMod val="50000"/>
-                    <a:lumOff val="50000"/>
-                  </a:schemeClr>
-                </a:solidFill>
-              </a:rPr>
-              <a:t>But swap-chain-created images have VK_IMAGE_LAYOUT_PRESENT_SOURCE_KHR layouts</a:t>
-            </a:r>
-          </a:p>
-          <a:p>
-            <a:pPr algn="ctr"/>
-            <a:endParaRPr lang="en-US" altLang="ko-KR" sz="1000">
-              <a:solidFill>
-                <a:schemeClr val="tx1">
-                  <a:lumMod val="50000"/>
-                  <a:lumOff val="50000"/>
-                </a:schemeClr>
-              </a:solidFill>
-            </a:endParaRPr>
-          </a:p>
-          <a:p>
-            <a:pPr algn="ctr"/>
-            <a:r>
-              <a:rPr lang="en-US" altLang="ko-KR" sz="1000">
-                <a:solidFill>
-                  <a:schemeClr val="tx1">
-                    <a:lumMod val="50000"/>
-                    <a:lumOff val="50000"/>
-                  </a:schemeClr>
-                </a:solidFill>
-              </a:rPr>
-              <a:t>To transit from one layout to other, image memory barriers are used</a:t>
-            </a:r>
-          </a:p>
-        </p:txBody>
-      </p:sp>
-      <p:sp>
-        <p:nvSpPr>
-          <p:cNvPr id="20" name="사각형: 둥근 모서리 19">
-            <a:extLst>
-              <a:ext uri="{FF2B5EF4-FFF2-40B4-BE49-F238E27FC236}">
-                <a16:creationId xmlns:a16="http://schemas.microsoft.com/office/drawing/2014/main" id="{478B8B9B-E42F-49C0-9E75-6DF54FD4A5E6}"/>
-              </a:ext>
-            </a:extLst>
-          </p:cNvPr>
-          <p:cNvSpPr/>
-          <p:nvPr/>
-        </p:nvSpPr>
-        <p:spPr>
-          <a:xfrm>
-            <a:off x="5991608" y="4086880"/>
-            <a:ext cx="783901" cy="322255"/>
-          </a:xfrm>
-          <a:prstGeom prst="roundRect">
-            <a:avLst>
-              <a:gd name="adj" fmla="val 13668"/>
-            </a:avLst>
-          </a:prstGeom>
-          <a:solidFill>
-            <a:schemeClr val="accent6">
-              <a:lumMod val="50000"/>
-            </a:schemeClr>
-          </a:solidFill>
           <a:ln w="25400">
             <a:solidFill>
-              <a:schemeClr val="accent6">
-                <a:lumMod val="20000"/>
-                <a:lumOff val="80000"/>
+              <a:schemeClr val="tx1">
+                <a:lumMod val="50000"/>
+                <a:lumOff val="50000"/>
               </a:schemeClr>
             </a:solidFill>
-            <a:prstDash val="solid"/>
+            <a:tailEnd type="triangle"/>
           </a:ln>
         </p:spPr>
         <p:style>
-          <a:lnRef idx="2">
-            <a:schemeClr val="accent1">
-              <a:shade val="50000"/>
-            </a:schemeClr>
+          <a:lnRef idx="1">
+            <a:schemeClr val="accent1"/>
           </a:lnRef>
-          <a:fillRef idx="1">
+          <a:fillRef idx="0">
             <a:schemeClr val="accent1"/>
           </a:fillRef>
           <a:effectRef idx="0">
             <a:schemeClr val="accent1"/>
           </a:effectRef>
           <a:fontRef idx="minor">
-            <a:schemeClr val="lt1"/>
+            <a:schemeClr val="tx1"/>
           </a:fontRef>
         </p:style>
-        <p:txBody>
-          <a:bodyPr rtlCol="0" anchor="ctr"/>
-          <a:lstStyle/>
-          <a:p>
-            <a:pPr algn="ctr"/>
-            <a:r>
-              <a:rPr lang="en-US" altLang="ko-KR" sz="1100">
-                <a:solidFill>
-                  <a:schemeClr val="accent6">
-                    <a:lumMod val="20000"/>
-                    <a:lumOff val="80000"/>
-                  </a:schemeClr>
-                </a:solidFill>
-              </a:rPr>
-              <a:t>Present</a:t>
-            </a:r>
-            <a:endParaRPr lang="ko-KR" altLang="en-US" sz="1100">
-              <a:solidFill>
-                <a:schemeClr val="accent6">
-                  <a:lumMod val="20000"/>
-                  <a:lumOff val="80000"/>
-                </a:schemeClr>
-              </a:solidFill>
-            </a:endParaRPr>
-          </a:p>
-        </p:txBody>
-      </p:sp>
-      <p:sp>
-        <p:nvSpPr>
-          <p:cNvPr id="21" name="사각형: 둥근 모서리 20">
-            <a:extLst>
-              <a:ext uri="{FF2B5EF4-FFF2-40B4-BE49-F238E27FC236}">
-                <a16:creationId xmlns:a16="http://schemas.microsoft.com/office/drawing/2014/main" id="{4B4B7222-E065-4953-A03B-9338FE58D35E}"/>
-              </a:ext>
-            </a:extLst>
-          </p:cNvPr>
-          <p:cNvSpPr/>
-          <p:nvPr/>
-        </p:nvSpPr>
-        <p:spPr>
-          <a:xfrm>
-            <a:off x="7866679" y="4090354"/>
-            <a:ext cx="783901" cy="322255"/>
-          </a:xfrm>
-          <a:prstGeom prst="roundRect">
-            <a:avLst>
-              <a:gd name="adj" fmla="val 13668"/>
-            </a:avLst>
-          </a:prstGeom>
-          <a:solidFill>
-            <a:schemeClr val="accent6">
-              <a:lumMod val="50000"/>
-            </a:schemeClr>
-          </a:solidFill>
-          <a:ln w="25400">
-            <a:solidFill>
-              <a:schemeClr val="accent6">
-                <a:lumMod val="20000"/>
-                <a:lumOff val="80000"/>
-              </a:schemeClr>
-            </a:solidFill>
-            <a:prstDash val="solid"/>
-          </a:ln>
-        </p:spPr>
-        <p:style>
-          <a:lnRef idx="2">
-            <a:schemeClr val="accent1">
-              <a:shade val="50000"/>
-            </a:schemeClr>
-          </a:lnRef>
-          <a:fillRef idx="1">
-            <a:schemeClr val="accent1"/>
-          </a:fillRef>
-          <a:effectRef idx="0">
-            <a:schemeClr val="accent1"/>
-          </a:effectRef>
-          <a:fontRef idx="minor">
-            <a:schemeClr val="lt1"/>
-          </a:fontRef>
-        </p:style>
-        <p:txBody>
-          <a:bodyPr rtlCol="0" anchor="ctr"/>
-          <a:lstStyle/>
-          <a:p>
-            <a:pPr algn="ctr"/>
-            <a:r>
-              <a:rPr lang="en-US" altLang="ko-KR" sz="1100">
-                <a:solidFill>
-                  <a:schemeClr val="accent6">
-                    <a:lumMod val="20000"/>
-                    <a:lumOff val="80000"/>
-                  </a:schemeClr>
-                </a:solidFill>
-              </a:rPr>
-              <a:t>Clear</a:t>
-            </a:r>
-            <a:endParaRPr lang="ko-KR" altLang="en-US" sz="1100">
-              <a:solidFill>
-                <a:schemeClr val="accent6">
-                  <a:lumMod val="20000"/>
-                  <a:lumOff val="80000"/>
-                </a:schemeClr>
-              </a:solidFill>
-            </a:endParaRPr>
-          </a:p>
-        </p:txBody>
-      </p:sp>
-      <p:sp>
-        <p:nvSpPr>
-          <p:cNvPr id="22" name="사각형: 둥근 모서리 21">
-            <a:extLst>
-              <a:ext uri="{FF2B5EF4-FFF2-40B4-BE49-F238E27FC236}">
-                <a16:creationId xmlns:a16="http://schemas.microsoft.com/office/drawing/2014/main" id="{B83376BA-223F-423A-9F99-45C32537DA2A}"/>
-              </a:ext>
-            </a:extLst>
-          </p:cNvPr>
-          <p:cNvSpPr/>
-          <p:nvPr/>
-        </p:nvSpPr>
-        <p:spPr>
-          <a:xfrm>
-            <a:off x="9716320" y="4090354"/>
-            <a:ext cx="783901" cy="322255"/>
-          </a:xfrm>
-          <a:prstGeom prst="roundRect">
-            <a:avLst>
-              <a:gd name="adj" fmla="val 13668"/>
-            </a:avLst>
-          </a:prstGeom>
-          <a:solidFill>
-            <a:schemeClr val="accent6">
-              <a:lumMod val="50000"/>
-            </a:schemeClr>
-          </a:solidFill>
-          <a:ln w="25400">
-            <a:solidFill>
-              <a:schemeClr val="accent6">
-                <a:lumMod val="20000"/>
-                <a:lumOff val="80000"/>
-              </a:schemeClr>
-            </a:solidFill>
-            <a:prstDash val="solid"/>
-          </a:ln>
-        </p:spPr>
-        <p:style>
-          <a:lnRef idx="2">
-            <a:schemeClr val="accent1">
-              <a:shade val="50000"/>
-            </a:schemeClr>
-          </a:lnRef>
-          <a:fillRef idx="1">
-            <a:schemeClr val="accent1"/>
-          </a:fillRef>
-          <a:effectRef idx="0">
-            <a:schemeClr val="accent1"/>
-          </a:effectRef>
-          <a:fontRef idx="minor">
-            <a:schemeClr val="lt1"/>
-          </a:fontRef>
-        </p:style>
-        <p:txBody>
-          <a:bodyPr rtlCol="0" anchor="ctr"/>
-          <a:lstStyle/>
-          <a:p>
-            <a:pPr algn="ctr"/>
-            <a:r>
-              <a:rPr lang="en-US" altLang="ko-KR" sz="1100">
-                <a:solidFill>
-                  <a:schemeClr val="accent6">
-                    <a:lumMod val="20000"/>
-                    <a:lumOff val="80000"/>
-                  </a:schemeClr>
-                </a:solidFill>
-              </a:rPr>
-              <a:t>Present</a:t>
-            </a:r>
-            <a:endParaRPr lang="ko-KR" altLang="en-US" sz="1100">
-              <a:solidFill>
-                <a:schemeClr val="accent6">
-                  <a:lumMod val="20000"/>
-                  <a:lumOff val="80000"/>
-                </a:schemeClr>
-              </a:solidFill>
-            </a:endParaRPr>
-          </a:p>
-        </p:txBody>
-      </p:sp>
+      </p:cxnSp>
     </p:spTree>
     <p:extLst>
       <p:ext uri="{BB962C8B-B14F-4D97-AF65-F5344CB8AC3E}">
-        <p14:creationId xmlns:p14="http://schemas.microsoft.com/office/powerpoint/2010/main" val="1877049561"/>
+        <p14:creationId xmlns:p14="http://schemas.microsoft.com/office/powerpoint/2010/main" val="3053498206"/>
       </p:ext>
     </p:extLst>
   </p:cSld>
@@ -15214,10 +14786,82 @@
       </p:grpSpPr>
       <p:sp>
         <p:nvSpPr>
-          <p:cNvPr id="23" name="사각형: 둥근 모서리 22">
-            <a:extLst>
-              <a:ext uri="{FF2B5EF4-FFF2-40B4-BE49-F238E27FC236}">
-                <a16:creationId xmlns:a16="http://schemas.microsoft.com/office/drawing/2014/main" id="{F4731D38-8163-4621-8804-C535A6036187}"/>
+          <p:cNvPr id="64" name="TextBox 63">
+            <a:extLst>
+              <a:ext uri="{FF2B5EF4-FFF2-40B4-BE49-F238E27FC236}">
+                <a16:creationId xmlns:a16="http://schemas.microsoft.com/office/drawing/2014/main" id="{C949A911-30CD-4E8B-8D56-09D3D3C9CE98}"/>
+              </a:ext>
+            </a:extLst>
+          </p:cNvPr>
+          <p:cNvSpPr txBox="1"/>
+          <p:nvPr/>
+        </p:nvSpPr>
+        <p:spPr>
+          <a:xfrm>
+            <a:off x="0" y="15118"/>
+            <a:ext cx="4153509" cy="461665"/>
+          </a:xfrm>
+          <a:prstGeom prst="rect">
+            <a:avLst/>
+          </a:prstGeom>
+          <a:noFill/>
+        </p:spPr>
+        <p:txBody>
+          <a:bodyPr wrap="none" rtlCol="0">
+            <a:spAutoFit/>
+          </a:bodyPr>
+          <a:lstStyle/>
+          <a:p>
+            <a:r>
+              <a:rPr lang="en-US" altLang="ko-KR" sz="2400" b="1">
+                <a:solidFill>
+                  <a:schemeClr val="tx1">
+                    <a:lumMod val="50000"/>
+                    <a:lumOff val="50000"/>
+                  </a:schemeClr>
+                </a:solidFill>
+              </a:rPr>
+              <a:t>Command</a:t>
+            </a:r>
+            <a:r>
+              <a:rPr lang="ko-KR" altLang="en-US" sz="2400" b="1">
+                <a:solidFill>
+                  <a:schemeClr val="tx1">
+                    <a:lumMod val="50000"/>
+                    <a:lumOff val="50000"/>
+                  </a:schemeClr>
+                </a:solidFill>
+              </a:rPr>
+              <a:t> </a:t>
+            </a:r>
+            <a:r>
+              <a:rPr lang="en-US" altLang="ko-KR" sz="2400" b="1">
+                <a:solidFill>
+                  <a:schemeClr val="tx1">
+                    <a:lumMod val="50000"/>
+                    <a:lumOff val="50000"/>
+                  </a:schemeClr>
+                </a:solidFill>
+              </a:rPr>
+              <a:t>Pool (Outdated)</a:t>
+            </a:r>
+            <a:endParaRPr lang="ko-KR" altLang="en-US" sz="2400">
+              <a:solidFill>
+                <a:schemeClr val="tx1">
+                  <a:lumMod val="50000"/>
+                  <a:lumOff val="50000"/>
+                </a:schemeClr>
+              </a:solidFill>
+            </a:endParaRPr>
+          </a:p>
+        </p:txBody>
+      </p:sp>
+      <p:sp>
+        <p:nvSpPr>
+          <p:cNvPr id="69" name="사각형: 둥근 모서리 68">
+            <a:extLst>
+              <a:ext uri="{FF2B5EF4-FFF2-40B4-BE49-F238E27FC236}">
+                <a16:creationId xmlns:a16="http://schemas.microsoft.com/office/drawing/2014/main" id="{4B6180A7-9D48-4037-942E-84B520DF1A34}"/>
               </a:ext>
             </a:extLst>
           </p:cNvPr>
@@ -15226,8 +14870,8 @@
         </p:nvSpPr>
         <p:spPr>
           <a:xfrm>
-            <a:off x="5434204" y="2232913"/>
-            <a:ext cx="1323591" cy="322255"/>
+            <a:off x="865463" y="1621588"/>
+            <a:ext cx="1249961" cy="461664"/>
           </a:xfrm>
           <a:prstGeom prst="roundRect">
             <a:avLst>
@@ -15235,14 +14879,15 @@
             </a:avLst>
           </a:prstGeom>
           <a:solidFill>
-            <a:schemeClr val="bg2">
-              <a:lumMod val="90000"/>
+            <a:schemeClr val="accent6">
+              <a:lumMod val="50000"/>
             </a:schemeClr>
           </a:solidFill>
           <a:ln w="25400">
             <a:solidFill>
-              <a:schemeClr val="bg2">
-                <a:lumMod val="25000"/>
+              <a:schemeClr val="accent6">
+                <a:lumMod val="20000"/>
+                <a:lumOff val="80000"/>
               </a:schemeClr>
             </a:solidFill>
             <a:prstDash val="solid"/>
@@ -15270,21 +14915,21 @@
           <a:p>
             <a:pPr algn="ctr"/>
             <a:r>
-              <a:rPr lang="en-US" altLang="ko-KR" sz="1400">
-                <a:solidFill>
-                  <a:schemeClr val="tx1">
-                    <a:lumMod val="85000"/>
-                    <a:lumOff val="15000"/>
+              <a:rPr lang="en-US" altLang="ko-KR" sz="1100">
+                <a:solidFill>
+                  <a:schemeClr val="accent6">
+                    <a:lumMod val="20000"/>
+                    <a:lumOff val="80000"/>
                   </a:schemeClr>
                 </a:solidFill>
               </a:rPr>
-              <a:t>Renderpass</a:t>
-            </a:r>
-            <a:endParaRPr lang="ko-KR" altLang="en-US" sz="1400">
+              <a:t>Present Queue Command Pool</a:t>
+            </a:r>
+            <a:endParaRPr lang="ko-KR" altLang="en-US" sz="1100">
               <a:solidFill>
-                <a:schemeClr val="tx1">
-                  <a:lumMod val="85000"/>
-                  <a:lumOff val="15000"/>
+                <a:schemeClr val="accent6">
+                  <a:lumMod val="20000"/>
+                  <a:lumOff val="80000"/>
                 </a:schemeClr>
               </a:solidFill>
             </a:endParaRPr>
@@ -15293,10 +14938,10 @@
       </p:sp>
       <p:sp>
         <p:nvSpPr>
-          <p:cNvPr id="24" name="사각형: 둥근 모서리 23">
-            <a:extLst>
-              <a:ext uri="{FF2B5EF4-FFF2-40B4-BE49-F238E27FC236}">
-                <a16:creationId xmlns:a16="http://schemas.microsoft.com/office/drawing/2014/main" id="{C38FA2A6-1667-417D-9148-4ED98CF6F901}"/>
+          <p:cNvPr id="70" name="사각형: 둥근 모서리 69">
+            <a:extLst>
+              <a:ext uri="{FF2B5EF4-FFF2-40B4-BE49-F238E27FC236}">
+                <a16:creationId xmlns:a16="http://schemas.microsoft.com/office/drawing/2014/main" id="{7AB0AF86-9994-4628-8949-1D0C9845FE1B}"/>
               </a:ext>
             </a:extLst>
           </p:cNvPr>
@@ -15305,26 +14950,25 @@
         </p:nvSpPr>
         <p:spPr>
           <a:xfrm>
-            <a:off x="4449538" y="3267871"/>
-            <a:ext cx="890520" cy="322255"/>
+            <a:off x="1133431" y="794832"/>
+            <a:ext cx="714024" cy="237167"/>
           </a:xfrm>
           <a:prstGeom prst="roundRect">
             <a:avLst>
-              <a:gd name="adj" fmla="val 13668"/>
+              <a:gd name="adj" fmla="val 18826"/>
             </a:avLst>
           </a:prstGeom>
           <a:solidFill>
-            <a:schemeClr val="bg2">
-              <a:lumMod val="90000"/>
-            </a:schemeClr>
+            <a:srgbClr val="F2F7FC"/>
           </a:solidFill>
-          <a:ln w="25400">
+          <a:ln w="19050">
             <a:solidFill>
-              <a:schemeClr val="bg2">
-                <a:lumMod val="25000"/>
+              <a:schemeClr val="accent5">
+                <a:lumMod val="60000"/>
+                <a:lumOff val="40000"/>
               </a:schemeClr>
             </a:solidFill>
-            <a:prstDash val="solid"/>
+            <a:prstDash val="sysDash"/>
           </a:ln>
         </p:spPr>
         <p:style>
@@ -15349,21 +14993,19 @@
           <a:p>
             <a:pPr algn="ctr"/>
             <a:r>
-              <a:rPr lang="en-US" altLang="ko-KR" sz="1400">
-                <a:solidFill>
-                  <a:schemeClr val="tx1">
-                    <a:lumMod val="85000"/>
-                    <a:lumOff val="15000"/>
+              <a:rPr lang="en-US" altLang="ko-KR" sz="1100" b="1">
+                <a:solidFill>
+                  <a:schemeClr val="accent5">
+                    <a:lumMod val="50000"/>
                   </a:schemeClr>
                 </a:solidFill>
               </a:rPr>
-              <a:t>Subpass</a:t>
-            </a:r>
-            <a:endParaRPr lang="ko-KR" altLang="en-US" sz="1400">
+              <a:t>Queue</a:t>
+            </a:r>
+            <a:endParaRPr lang="ko-KR" altLang="en-US" sz="1100" b="1">
               <a:solidFill>
-                <a:schemeClr val="tx1">
-                  <a:lumMod val="85000"/>
-                  <a:lumOff val="15000"/>
+                <a:schemeClr val="accent5">
+                  <a:lumMod val="50000"/>
                 </a:schemeClr>
               </a:solidFill>
             </a:endParaRPr>
@@ -15372,10 +15014,10 @@
       </p:sp>
       <p:sp>
         <p:nvSpPr>
-          <p:cNvPr id="25" name="사각형: 둥근 모서리 24">
-            <a:extLst>
-              <a:ext uri="{FF2B5EF4-FFF2-40B4-BE49-F238E27FC236}">
-                <a16:creationId xmlns:a16="http://schemas.microsoft.com/office/drawing/2014/main" id="{20CC4E15-D3B7-45EF-8C23-A14FFC3C171C}"/>
+          <p:cNvPr id="4" name="타원 3">
+            <a:extLst>
+              <a:ext uri="{FF2B5EF4-FFF2-40B4-BE49-F238E27FC236}">
+                <a16:creationId xmlns:a16="http://schemas.microsoft.com/office/drawing/2014/main" id="{76E704CC-73E1-4339-BB0A-5E17FAD6F741}"/>
               </a:ext>
             </a:extLst>
           </p:cNvPr>
@@ -15384,26 +15026,23 @@
         </p:nvSpPr>
         <p:spPr>
           <a:xfrm>
-            <a:off x="6936429" y="3267872"/>
-            <a:ext cx="1269034" cy="322255"/>
-          </a:xfrm>
-          <a:prstGeom prst="roundRect">
-            <a:avLst>
-              <a:gd name="adj" fmla="val 13668"/>
-            </a:avLst>
+            <a:off x="1449742" y="1134692"/>
+            <a:ext cx="81402" cy="81402"/>
+          </a:xfrm>
+          <a:prstGeom prst="ellipse">
+            <a:avLst/>
           </a:prstGeom>
           <a:solidFill>
-            <a:schemeClr val="bg2">
-              <a:lumMod val="90000"/>
+            <a:schemeClr val="accent5">
+              <a:lumMod val="20000"/>
+              <a:lumOff val="80000"/>
             </a:schemeClr>
           </a:solidFill>
           <a:ln w="25400">
-            <a:solidFill>
-              <a:schemeClr val="bg2">
-                <a:lumMod val="25000"/>
-              </a:schemeClr>
-            </a:solidFill>
+            <a:noFill/>
             <a:prstDash val="solid"/>
+            <a:headEnd type="none"/>
+            <a:tailEnd type="triangle"/>
           </a:ln>
         </p:spPr>
         <p:style>
@@ -15427,22 +15066,200 @@
           <a:lstStyle/>
           <a:p>
             <a:pPr algn="ctr"/>
-            <a:r>
-              <a:rPr lang="en-US" altLang="ko-KR" sz="1400">
-                <a:solidFill>
-                  <a:schemeClr val="tx1">
-                    <a:lumMod val="85000"/>
-                    <a:lumOff val="15000"/>
+            <a:endParaRPr lang="ko-KR" altLang="en-US"/>
+          </a:p>
+        </p:txBody>
+      </p:sp>
+      <p:sp>
+        <p:nvSpPr>
+          <p:cNvPr id="71" name="타원 70">
+            <a:extLst>
+              <a:ext uri="{FF2B5EF4-FFF2-40B4-BE49-F238E27FC236}">
+                <a16:creationId xmlns:a16="http://schemas.microsoft.com/office/drawing/2014/main" id="{7D0C3197-46BF-4B2B-97D2-CF50E4C81A1D}"/>
+              </a:ext>
+            </a:extLst>
+          </p:cNvPr>
+          <p:cNvSpPr/>
+          <p:nvPr/>
+        </p:nvSpPr>
+        <p:spPr>
+          <a:xfrm>
+            <a:off x="1449742" y="1286092"/>
+            <a:ext cx="81402" cy="81402"/>
+          </a:xfrm>
+          <a:prstGeom prst="ellipse">
+            <a:avLst/>
+          </a:prstGeom>
+          <a:solidFill>
+            <a:schemeClr val="accent5">
+              <a:lumMod val="20000"/>
+              <a:lumOff val="80000"/>
+            </a:schemeClr>
+          </a:solidFill>
+          <a:ln w="25400">
+            <a:noFill/>
+            <a:prstDash val="solid"/>
+            <a:headEnd type="none"/>
+            <a:tailEnd type="triangle"/>
+          </a:ln>
+        </p:spPr>
+        <p:style>
+          <a:lnRef idx="2">
+            <a:schemeClr val="accent1">
+              <a:shade val="50000"/>
+            </a:schemeClr>
+          </a:lnRef>
+          <a:fillRef idx="1">
+            <a:schemeClr val="accent1"/>
+          </a:fillRef>
+          <a:effectRef idx="0">
+            <a:schemeClr val="accent1"/>
+          </a:effectRef>
+          <a:fontRef idx="minor">
+            <a:schemeClr val="lt1"/>
+          </a:fontRef>
+        </p:style>
+        <p:txBody>
+          <a:bodyPr rtlCol="0" anchor="ctr"/>
+          <a:lstStyle/>
+          <a:p>
+            <a:pPr algn="ctr"/>
+            <a:endParaRPr lang="ko-KR" altLang="en-US"/>
+          </a:p>
+        </p:txBody>
+      </p:sp>
+      <p:sp>
+        <p:nvSpPr>
+          <p:cNvPr id="72" name="타원 71">
+            <a:extLst>
+              <a:ext uri="{FF2B5EF4-FFF2-40B4-BE49-F238E27FC236}">
+                <a16:creationId xmlns:a16="http://schemas.microsoft.com/office/drawing/2014/main" id="{5F364FD6-0592-470D-AE28-48C56563113C}"/>
+              </a:ext>
+            </a:extLst>
+          </p:cNvPr>
+          <p:cNvSpPr/>
+          <p:nvPr/>
+        </p:nvSpPr>
+        <p:spPr>
+          <a:xfrm>
+            <a:off x="1449742" y="1437492"/>
+            <a:ext cx="81402" cy="81402"/>
+          </a:xfrm>
+          <a:prstGeom prst="ellipse">
+            <a:avLst/>
+          </a:prstGeom>
+          <a:solidFill>
+            <a:schemeClr val="accent5">
+              <a:lumMod val="20000"/>
+              <a:lumOff val="80000"/>
+            </a:schemeClr>
+          </a:solidFill>
+          <a:ln w="25400">
+            <a:noFill/>
+            <a:prstDash val="solid"/>
+            <a:headEnd type="none"/>
+            <a:tailEnd type="triangle"/>
+          </a:ln>
+        </p:spPr>
+        <p:style>
+          <a:lnRef idx="2">
+            <a:schemeClr val="accent1">
+              <a:shade val="50000"/>
+            </a:schemeClr>
+          </a:lnRef>
+          <a:fillRef idx="1">
+            <a:schemeClr val="accent1"/>
+          </a:fillRef>
+          <a:effectRef idx="0">
+            <a:schemeClr val="accent1"/>
+          </a:effectRef>
+          <a:fontRef idx="minor">
+            <a:schemeClr val="lt1"/>
+          </a:fontRef>
+        </p:style>
+        <p:txBody>
+          <a:bodyPr rtlCol="0" anchor="ctr"/>
+          <a:lstStyle/>
+          <a:p>
+            <a:pPr algn="ctr"/>
+            <a:endParaRPr lang="ko-KR" altLang="en-US"/>
+          </a:p>
+        </p:txBody>
+      </p:sp>
+      <p:sp>
+        <p:nvSpPr>
+          <p:cNvPr id="73" name="사각형: 둥근 모서리 72">
+            <a:extLst>
+              <a:ext uri="{FF2B5EF4-FFF2-40B4-BE49-F238E27FC236}">
+                <a16:creationId xmlns:a16="http://schemas.microsoft.com/office/drawing/2014/main" id="{5CBB4D80-5E24-4F50-9835-46B18C667F4E}"/>
+              </a:ext>
+            </a:extLst>
+          </p:cNvPr>
+          <p:cNvSpPr/>
+          <p:nvPr/>
+        </p:nvSpPr>
+        <p:spPr>
+          <a:xfrm>
+            <a:off x="3448181" y="1621588"/>
+            <a:ext cx="1477687" cy="461664"/>
+          </a:xfrm>
+          <a:prstGeom prst="roundRect">
+            <a:avLst>
+              <a:gd name="adj" fmla="val 13668"/>
+            </a:avLst>
+          </a:prstGeom>
+          <a:solidFill>
+            <a:schemeClr val="accent6">
+              <a:lumMod val="50000"/>
+            </a:schemeClr>
+          </a:solidFill>
+          <a:ln w="25400">
+            <a:solidFill>
+              <a:schemeClr val="accent6">
+                <a:lumMod val="20000"/>
+                <a:lumOff val="80000"/>
+              </a:schemeClr>
+            </a:solidFill>
+            <a:prstDash val="solid"/>
+          </a:ln>
+        </p:spPr>
+        <p:style>
+          <a:lnRef idx="2">
+            <a:schemeClr val="accent1">
+              <a:shade val="50000"/>
+            </a:schemeClr>
+          </a:lnRef>
+          <a:fillRef idx="1">
+            <a:schemeClr val="accent1"/>
+          </a:fillRef>
+          <a:effectRef idx="0">
+            <a:schemeClr val="accent1"/>
+          </a:effectRef>
+          <a:fontRef idx="minor">
+            <a:schemeClr val="lt1"/>
+          </a:fontRef>
+        </p:style>
+        <p:txBody>
+          <a:bodyPr rtlCol="0" anchor="ctr"/>
+          <a:lstStyle/>
+          <a:p>
+            <a:pPr algn="ctr"/>
+            <a:r>
+              <a:rPr lang="en-US" altLang="ko-KR" sz="1100">
+                <a:solidFill>
+                  <a:schemeClr val="accent6">
+                    <a:lumMod val="20000"/>
+                    <a:lumOff val="80000"/>
                   </a:schemeClr>
                 </a:solidFill>
               </a:rPr>
-              <a:t>Attachment</a:t>
-            </a:r>
-            <a:endParaRPr lang="ko-KR" altLang="en-US" sz="1400">
+              <a:t>Present Queue Command Buffers</a:t>
+            </a:r>
+            <a:endParaRPr lang="ko-KR" altLang="en-US" sz="1100">
               <a:solidFill>
-                <a:schemeClr val="tx1">
-                  <a:lumMod val="85000"/>
-                  <a:lumOff val="15000"/>
+                <a:schemeClr val="accent6">
+                  <a:lumMod val="20000"/>
+                  <a:lumOff val="80000"/>
                 </a:schemeClr>
               </a:solidFill>
             </a:endParaRPr>
@@ -15451,34 +15268,35 @@
       </p:sp>
       <p:sp>
         <p:nvSpPr>
-          <p:cNvPr id="26" name="직사각형 25">
-            <a:extLst>
-              <a:ext uri="{FF2B5EF4-FFF2-40B4-BE49-F238E27FC236}">
-                <a16:creationId xmlns:a16="http://schemas.microsoft.com/office/drawing/2014/main" id="{B946CEAB-F80C-400B-9B34-8B26A9CB75CD}"/>
-              </a:ext>
-            </a:extLst>
-          </p:cNvPr>
-          <p:cNvSpPr/>
-          <p:nvPr/>
-        </p:nvSpPr>
-        <p:spPr>
-          <a:xfrm>
-            <a:off x="4621056" y="2635940"/>
-            <a:ext cx="547484" cy="307777"/>
+          <p:cNvPr id="77" name="TextBox 76">
+            <a:extLst>
+              <a:ext uri="{FF2B5EF4-FFF2-40B4-BE49-F238E27FC236}">
+                <a16:creationId xmlns:a16="http://schemas.microsoft.com/office/drawing/2014/main" id="{B75C0C54-AE65-43AA-918E-896E9F7354D8}"/>
+              </a:ext>
+            </a:extLst>
+          </p:cNvPr>
+          <p:cNvSpPr txBox="1"/>
+          <p:nvPr/>
+        </p:nvSpPr>
+        <p:spPr>
+          <a:xfrm>
+            <a:off x="3549671" y="1375367"/>
+            <a:ext cx="1274708" cy="246221"/>
           </a:xfrm>
           <a:prstGeom prst="rect">
             <a:avLst/>
           </a:prstGeom>
-        </p:spPr>
-        <p:txBody>
-          <a:bodyPr wrap="square">
+          <a:noFill/>
+        </p:spPr>
+        <p:txBody>
+          <a:bodyPr wrap="none" rtlCol="0">
             <a:spAutoFit/>
           </a:bodyPr>
           <a:lstStyle/>
           <a:p>
             <a:pPr algn="ctr"/>
             <a:r>
-              <a:rPr lang="en-US" altLang="ko-KR" sz="1400">
+              <a:rPr lang="en-US" altLang="ko-KR" sz="1000">
                 <a:solidFill>
                   <a:schemeClr val="tx1">
                     <a:lumMod val="50000"/>
@@ -15486,115 +15304,37 @@
                   </a:schemeClr>
                 </a:solidFill>
               </a:rPr>
-              <a:t>hold</a:t>
-            </a:r>
-          </a:p>
-        </p:txBody>
-      </p:sp>
-      <p:sp>
-        <p:nvSpPr>
-          <p:cNvPr id="27" name="직사각형 26">
-            <a:extLst>
-              <a:ext uri="{FF2B5EF4-FFF2-40B4-BE49-F238E27FC236}">
-                <a16:creationId xmlns:a16="http://schemas.microsoft.com/office/drawing/2014/main" id="{E0AC11A8-5D4A-4E39-A1E9-2DF7B739AA4E}"/>
-              </a:ext>
-            </a:extLst>
-          </p:cNvPr>
-          <p:cNvSpPr/>
-          <p:nvPr/>
-        </p:nvSpPr>
-        <p:spPr>
-          <a:xfrm>
-            <a:off x="6936429" y="2635940"/>
-            <a:ext cx="547484" cy="307777"/>
-          </a:xfrm>
-          <a:prstGeom prst="rect">
-            <a:avLst/>
-          </a:prstGeom>
-        </p:spPr>
-        <p:txBody>
-          <a:bodyPr wrap="square">
-            <a:spAutoFit/>
-          </a:bodyPr>
-          <a:lstStyle/>
-          <a:p>
-            <a:pPr algn="ctr"/>
-            <a:r>
-              <a:rPr lang="en-US" altLang="ko-KR" sz="1400">
-                <a:solidFill>
-                  <a:schemeClr val="tx1">
-                    <a:lumMod val="50000"/>
-                    <a:lumOff val="50000"/>
-                  </a:schemeClr>
-                </a:solidFill>
-              </a:rPr>
-              <a:t>hold</a:t>
-            </a:r>
-          </a:p>
-        </p:txBody>
-      </p:sp>
-      <p:sp>
-        <p:nvSpPr>
-          <p:cNvPr id="28" name="직사각형 27">
-            <a:extLst>
-              <a:ext uri="{FF2B5EF4-FFF2-40B4-BE49-F238E27FC236}">
-                <a16:creationId xmlns:a16="http://schemas.microsoft.com/office/drawing/2014/main" id="{CAD7DF8B-F0A2-4DBF-BEAA-C0F4E5E55524}"/>
-              </a:ext>
-            </a:extLst>
-          </p:cNvPr>
-          <p:cNvSpPr/>
-          <p:nvPr/>
-        </p:nvSpPr>
-        <p:spPr>
-          <a:xfrm>
-            <a:off x="5640794" y="3121221"/>
-            <a:ext cx="994898" cy="307777"/>
-          </a:xfrm>
-          <a:prstGeom prst="rect">
-            <a:avLst/>
-          </a:prstGeom>
-        </p:spPr>
-        <p:txBody>
-          <a:bodyPr wrap="square">
-            <a:spAutoFit/>
-          </a:bodyPr>
-          <a:lstStyle/>
-          <a:p>
-            <a:pPr algn="ctr"/>
-            <a:r>
-              <a:rPr lang="en-US" altLang="ko-KR" sz="1400">
-                <a:solidFill>
-                  <a:schemeClr val="tx1">
-                    <a:lumMod val="50000"/>
-                    <a:lumOff val="50000"/>
-                  </a:schemeClr>
-                </a:solidFill>
-              </a:rPr>
-              <a:t>reference</a:t>
-            </a:r>
+              <a:t>Size : image_count</a:t>
+            </a:r>
+            <a:endParaRPr lang="ko-KR" altLang="en-US" sz="1000">
+              <a:solidFill>
+                <a:schemeClr val="tx1">
+                  <a:lumMod val="50000"/>
+                  <a:lumOff val="50000"/>
+                </a:schemeClr>
+              </a:solidFill>
+            </a:endParaRPr>
           </a:p>
         </p:txBody>
       </p:sp>
       <p:cxnSp>
         <p:nvCxnSpPr>
-          <p:cNvPr id="29" name="직선 화살표 연결선 28">
-            <a:extLst>
-              <a:ext uri="{FF2B5EF4-FFF2-40B4-BE49-F238E27FC236}">
-                <a16:creationId xmlns:a16="http://schemas.microsoft.com/office/drawing/2014/main" id="{8473C938-933F-47CD-9A91-E0EA8FB985E4}"/>
+          <p:cNvPr id="80" name="직선 화살표 연결선 79">
+            <a:extLst>
+              <a:ext uri="{FF2B5EF4-FFF2-40B4-BE49-F238E27FC236}">
+                <a16:creationId xmlns:a16="http://schemas.microsoft.com/office/drawing/2014/main" id="{C13471B3-B2E6-4EA5-A21F-C899F88D9643}"/>
               </a:ext>
             </a:extLst>
           </p:cNvPr>
           <p:cNvCxnSpPr>
             <a:cxnSpLocks/>
-            <a:stCxn id="24" idx="0"/>
-            <a:endCxn id="23" idx="2"/>
           </p:cNvCxnSpPr>
           <p:nvPr/>
         </p:nvCxnSpPr>
         <p:spPr>
-          <a:xfrm flipV="1">
-            <a:off x="4894798" y="2555168"/>
-            <a:ext cx="1201202" cy="712703"/>
+          <a:xfrm flipH="1">
+            <a:off x="2115424" y="1861366"/>
+            <a:ext cx="1332757" cy="0"/>
           </a:xfrm>
           <a:prstGeom prst="straightConnector1">
             <a:avLst/>
@@ -15624,108 +15364,844 @@
           </a:fontRef>
         </p:style>
       </p:cxnSp>
-      <p:cxnSp>
-        <p:nvCxnSpPr>
-          <p:cNvPr id="30" name="직선 화살표 연결선 29">
-            <a:extLst>
-              <a:ext uri="{FF2B5EF4-FFF2-40B4-BE49-F238E27FC236}">
-                <a16:creationId xmlns:a16="http://schemas.microsoft.com/office/drawing/2014/main" id="{55CB866E-5045-4520-82E5-E68E484E33E5}"/>
-              </a:ext>
-            </a:extLst>
-          </p:cNvPr>
-          <p:cNvCxnSpPr>
-            <a:cxnSpLocks/>
-            <a:stCxn id="25" idx="0"/>
-            <a:endCxn id="23" idx="2"/>
-          </p:cNvCxnSpPr>
-          <p:nvPr/>
-        </p:nvCxnSpPr>
-        <p:spPr>
-          <a:xfrm flipH="1" flipV="1">
-            <a:off x="6096000" y="2555168"/>
-            <a:ext cx="1474946" cy="712704"/>
-          </a:xfrm>
-          <a:prstGeom prst="straightConnector1">
+      <p:sp>
+        <p:nvSpPr>
+          <p:cNvPr id="82" name="TextBox 81">
+            <a:extLst>
+              <a:ext uri="{FF2B5EF4-FFF2-40B4-BE49-F238E27FC236}">
+                <a16:creationId xmlns:a16="http://schemas.microsoft.com/office/drawing/2014/main" id="{69518618-6388-487C-AAFF-B506957C061B}"/>
+              </a:ext>
+            </a:extLst>
+          </p:cNvPr>
+          <p:cNvSpPr txBox="1"/>
+          <p:nvPr/>
+        </p:nvSpPr>
+        <p:spPr>
+          <a:xfrm>
+            <a:off x="2464247" y="1602978"/>
+            <a:ext cx="635110" cy="246221"/>
+          </a:xfrm>
+          <a:prstGeom prst="rect">
             <a:avLst/>
           </a:prstGeom>
+          <a:noFill/>
+        </p:spPr>
+        <p:txBody>
+          <a:bodyPr wrap="none" rtlCol="0">
+            <a:spAutoFit/>
+          </a:bodyPr>
+          <a:lstStyle/>
+          <a:p>
+            <a:pPr algn="ctr"/>
+            <a:r>
+              <a:rPr lang="en-US" altLang="ko-KR" sz="1000">
+                <a:solidFill>
+                  <a:schemeClr val="tx1">
+                    <a:lumMod val="50000"/>
+                    <a:lumOff val="50000"/>
+                  </a:schemeClr>
+                </a:solidFill>
+              </a:rPr>
+              <a:t>allocate</a:t>
+            </a:r>
+            <a:endParaRPr lang="ko-KR" altLang="en-US" sz="1000">
+              <a:solidFill>
+                <a:schemeClr val="tx1">
+                  <a:lumMod val="50000"/>
+                  <a:lumOff val="50000"/>
+                </a:schemeClr>
+              </a:solidFill>
+            </a:endParaRPr>
+          </a:p>
+        </p:txBody>
+      </p:sp>
+      <p:sp>
+        <p:nvSpPr>
+          <p:cNvPr id="14" name="TextBox 13">
+            <a:extLst>
+              <a:ext uri="{FF2B5EF4-FFF2-40B4-BE49-F238E27FC236}">
+                <a16:creationId xmlns:a16="http://schemas.microsoft.com/office/drawing/2014/main" id="{BE563C21-2BF4-429D-8233-9452117BC3B2}"/>
+              </a:ext>
+            </a:extLst>
+          </p:cNvPr>
+          <p:cNvSpPr txBox="1"/>
+          <p:nvPr/>
+        </p:nvSpPr>
+        <p:spPr>
+          <a:xfrm>
+            <a:off x="6856688" y="601112"/>
+            <a:ext cx="3017173" cy="430887"/>
+          </a:xfrm>
+          <a:prstGeom prst="rect">
+            <a:avLst/>
+          </a:prstGeom>
+          <a:noFill/>
+        </p:spPr>
+        <p:txBody>
+          <a:bodyPr wrap="none" rtlCol="0">
+            <a:spAutoFit/>
+          </a:bodyPr>
+          <a:lstStyle/>
+          <a:p>
+            <a:r>
+              <a:rPr lang="en-US" altLang="ko-KR" sz="1100">
+                <a:solidFill>
+                  <a:schemeClr val="tx1">
+                    <a:lumMod val="50000"/>
+                    <a:lumOff val="50000"/>
+                  </a:schemeClr>
+                </a:solidFill>
+              </a:rPr>
+              <a:t>Image_count</a:t>
+            </a:r>
+            <a:r>
+              <a:rPr lang="ko-KR" altLang="en-US" sz="1100">
+                <a:solidFill>
+                  <a:schemeClr val="tx1">
+                    <a:lumMod val="50000"/>
+                    <a:lumOff val="50000"/>
+                  </a:schemeClr>
+                </a:solidFill>
+              </a:rPr>
+              <a:t>만큼 </a:t>
+            </a:r>
+            <a:r>
+              <a:rPr lang="en-US" altLang="ko-KR" sz="1100">
+                <a:solidFill>
+                  <a:schemeClr val="tx1">
+                    <a:lumMod val="50000"/>
+                    <a:lumOff val="50000"/>
+                  </a:schemeClr>
+                </a:solidFill>
+              </a:rPr>
+              <a:t>VkImage</a:t>
+            </a:r>
+            <a:r>
+              <a:rPr lang="ko-KR" altLang="en-US" sz="1100">
+                <a:solidFill>
+                  <a:schemeClr val="tx1">
+                    <a:lumMod val="50000"/>
+                    <a:lumOff val="50000"/>
+                  </a:schemeClr>
+                </a:solidFill>
+              </a:rPr>
+              <a:t>만듦</a:t>
+            </a:r>
+            <a:endParaRPr lang="en-US" altLang="ko-KR" sz="1100">
+              <a:solidFill>
+                <a:schemeClr val="tx1">
+                  <a:lumMod val="50000"/>
+                  <a:lumOff val="50000"/>
+                </a:schemeClr>
+              </a:solidFill>
+            </a:endParaRPr>
+          </a:p>
+          <a:p>
+            <a:r>
+              <a:rPr lang="en-US" altLang="ko-KR" sz="1100">
+                <a:solidFill>
+                  <a:schemeClr val="tx1">
+                    <a:lumMod val="50000"/>
+                    <a:lumOff val="50000"/>
+                  </a:schemeClr>
+                </a:solidFill>
+              </a:rPr>
+              <a:t>Swapchain</a:t>
+            </a:r>
+            <a:r>
+              <a:rPr lang="ko-KR" altLang="en-US" sz="1100">
+                <a:solidFill>
+                  <a:schemeClr val="tx1">
+                    <a:lumMod val="50000"/>
+                    <a:lumOff val="50000"/>
+                  </a:schemeClr>
+                </a:solidFill>
+              </a:rPr>
+              <a:t>에서 </a:t>
+            </a:r>
+            <a:r>
+              <a:rPr lang="en-US" altLang="ko-KR" sz="1100">
+                <a:solidFill>
+                  <a:schemeClr val="tx1">
+                    <a:lumMod val="50000"/>
+                    <a:lumOff val="50000"/>
+                  </a:schemeClr>
+                </a:solidFill>
+              </a:rPr>
+              <a:t>image handle</a:t>
+            </a:r>
+            <a:r>
+              <a:rPr lang="ko-KR" altLang="en-US" sz="1100">
+                <a:solidFill>
+                  <a:schemeClr val="tx1">
+                    <a:lumMod val="50000"/>
+                    <a:lumOff val="50000"/>
+                  </a:schemeClr>
+                </a:solidFill>
+              </a:rPr>
+              <a:t>을 가져와 저장</a:t>
+            </a:r>
+            <a:endParaRPr lang="en-US" altLang="ko-KR" sz="1100">
+              <a:solidFill>
+                <a:schemeClr val="tx1">
+                  <a:lumMod val="50000"/>
+                  <a:lumOff val="50000"/>
+                </a:schemeClr>
+              </a:solidFill>
+            </a:endParaRPr>
+          </a:p>
+        </p:txBody>
+      </p:sp>
+      <p:sp>
+        <p:nvSpPr>
+          <p:cNvPr id="3" name="직사각형 2">
+            <a:extLst>
+              <a:ext uri="{FF2B5EF4-FFF2-40B4-BE49-F238E27FC236}">
+                <a16:creationId xmlns:a16="http://schemas.microsoft.com/office/drawing/2014/main" id="{C359C448-5C9E-4F86-B9C6-D1E796012252}"/>
+              </a:ext>
+            </a:extLst>
+          </p:cNvPr>
+          <p:cNvSpPr/>
+          <p:nvPr/>
+        </p:nvSpPr>
+        <p:spPr>
+          <a:xfrm>
+            <a:off x="2323104" y="2076809"/>
+            <a:ext cx="3727839" cy="246221"/>
+          </a:xfrm>
+          <a:prstGeom prst="rect">
+            <a:avLst/>
+          </a:prstGeom>
+        </p:spPr>
+        <p:txBody>
+          <a:bodyPr wrap="square">
+            <a:spAutoFit/>
+          </a:bodyPr>
+          <a:lstStyle/>
+          <a:p>
+            <a:pPr algn="ctr"/>
+            <a:r>
+              <a:rPr lang="en-US" altLang="ko-KR" sz="1000">
+                <a:solidFill>
+                  <a:schemeClr val="tx1">
+                    <a:lumMod val="50000"/>
+                    <a:lumOff val="50000"/>
+                  </a:schemeClr>
+                </a:solidFill>
+                <a:ea typeface="돋움체" panose="020B0609000101010101" pitchFamily="49" charset="-127"/>
+              </a:rPr>
+              <a:t>VK_COMMAND_BUFFER_USAGE_SIMULTANEOUS_USE_BIT</a:t>
+            </a:r>
+            <a:endParaRPr lang="en-US" altLang="ko-KR" sz="1000">
+              <a:solidFill>
+                <a:schemeClr val="tx1">
+                  <a:lumMod val="50000"/>
+                  <a:lumOff val="50000"/>
+                </a:schemeClr>
+              </a:solidFill>
+            </a:endParaRPr>
+          </a:p>
+        </p:txBody>
+      </p:sp>
+      <p:sp>
+        <p:nvSpPr>
+          <p:cNvPr id="16" name="직사각형 15">
+            <a:extLst>
+              <a:ext uri="{FF2B5EF4-FFF2-40B4-BE49-F238E27FC236}">
+                <a16:creationId xmlns:a16="http://schemas.microsoft.com/office/drawing/2014/main" id="{3AA9C2B5-0317-472E-965E-20AFCFC9F18C}"/>
+              </a:ext>
+            </a:extLst>
+          </p:cNvPr>
+          <p:cNvSpPr/>
+          <p:nvPr/>
+        </p:nvSpPr>
+        <p:spPr>
+          <a:xfrm>
+            <a:off x="384635" y="2766393"/>
+            <a:ext cx="3727839" cy="246221"/>
+          </a:xfrm>
+          <a:prstGeom prst="rect">
+            <a:avLst/>
+          </a:prstGeom>
+        </p:spPr>
+        <p:txBody>
+          <a:bodyPr wrap="square">
+            <a:spAutoFit/>
+          </a:bodyPr>
+          <a:lstStyle/>
+          <a:p>
+            <a:pPr algn="ctr"/>
+            <a:r>
+              <a:rPr lang="en-US" altLang="ko-KR" sz="1000">
+                <a:solidFill>
+                  <a:schemeClr val="tx1">
+                    <a:lumMod val="50000"/>
+                    <a:lumOff val="50000"/>
+                  </a:schemeClr>
+                </a:solidFill>
+                <a:ea typeface="돋움체" panose="020B0609000101010101" pitchFamily="49" charset="-127"/>
+              </a:rPr>
+              <a:t>Primary,</a:t>
+            </a:r>
+            <a:r>
+              <a:rPr lang="ko-KR" altLang="en-US" sz="1000">
+                <a:solidFill>
+                  <a:schemeClr val="tx1">
+                    <a:lumMod val="50000"/>
+                    <a:lumOff val="50000"/>
+                  </a:schemeClr>
+                </a:solidFill>
+                <a:ea typeface="돋움체" panose="020B0609000101010101" pitchFamily="49" charset="-127"/>
+              </a:rPr>
+              <a:t> </a:t>
+            </a:r>
+            <a:r>
+              <a:rPr lang="en-US" altLang="ko-KR" sz="1000">
+                <a:solidFill>
+                  <a:schemeClr val="tx1">
+                    <a:lumMod val="50000"/>
+                    <a:lumOff val="50000"/>
+                  </a:schemeClr>
+                </a:solidFill>
+                <a:ea typeface="돋움체" panose="020B0609000101010101" pitchFamily="49" charset="-127"/>
+              </a:rPr>
+              <a:t>Secondary Command</a:t>
+            </a:r>
+            <a:endParaRPr lang="en-US" altLang="ko-KR" sz="1000">
+              <a:solidFill>
+                <a:schemeClr val="tx1">
+                  <a:lumMod val="50000"/>
+                  <a:lumOff val="50000"/>
+                </a:schemeClr>
+              </a:solidFill>
+            </a:endParaRPr>
+          </a:p>
+        </p:txBody>
+      </p:sp>
+      <p:sp>
+        <p:nvSpPr>
+          <p:cNvPr id="17" name="직사각형 16">
+            <a:extLst>
+              <a:ext uri="{FF2B5EF4-FFF2-40B4-BE49-F238E27FC236}">
+                <a16:creationId xmlns:a16="http://schemas.microsoft.com/office/drawing/2014/main" id="{2E645339-CE11-4CB0-B194-D3AA6C8F211B}"/>
+              </a:ext>
+            </a:extLst>
+          </p:cNvPr>
+          <p:cNvSpPr/>
+          <p:nvPr/>
+        </p:nvSpPr>
+        <p:spPr>
+          <a:xfrm>
+            <a:off x="6856688" y="1134692"/>
+            <a:ext cx="3727839" cy="246221"/>
+          </a:xfrm>
+          <a:prstGeom prst="rect">
+            <a:avLst/>
+          </a:prstGeom>
+        </p:spPr>
+        <p:txBody>
+          <a:bodyPr wrap="square">
+            <a:spAutoFit/>
+          </a:bodyPr>
+          <a:lstStyle/>
+          <a:p>
+            <a:r>
+              <a:rPr lang="en-US" altLang="ko-KR" sz="1000">
+                <a:solidFill>
+                  <a:schemeClr val="tx1">
+                    <a:lumMod val="50000"/>
+                    <a:lumOff val="50000"/>
+                  </a:schemeClr>
+                </a:solidFill>
+              </a:rPr>
+              <a:t>Image_subresource = </a:t>
+            </a:r>
+            <a:r>
+              <a:rPr lang="ko-KR" altLang="en-US" sz="1000">
+                <a:solidFill>
+                  <a:schemeClr val="tx1">
+                    <a:lumMod val="50000"/>
+                    <a:lumOff val="50000"/>
+                  </a:schemeClr>
+                </a:solidFill>
+              </a:rPr>
+              <a:t>이미지 설정 </a:t>
+            </a:r>
+            <a:r>
+              <a:rPr lang="en-US" altLang="ko-KR" sz="1000">
+                <a:solidFill>
+                  <a:schemeClr val="tx1">
+                    <a:lumMod val="50000"/>
+                    <a:lumOff val="50000"/>
+                  </a:schemeClr>
+                </a:solidFill>
+              </a:rPr>
+              <a:t>(</a:t>
+            </a:r>
+            <a:r>
+              <a:rPr lang="ko-KR" altLang="en-US" sz="1000">
+                <a:solidFill>
+                  <a:schemeClr val="tx1">
+                    <a:lumMod val="50000"/>
+                    <a:lumOff val="50000"/>
+                  </a:schemeClr>
+                </a:solidFill>
+              </a:rPr>
+              <a:t>밈맵</a:t>
+            </a:r>
+            <a:r>
+              <a:rPr lang="en-US" altLang="ko-KR" sz="1000">
+                <a:solidFill>
+                  <a:schemeClr val="tx1">
+                    <a:lumMod val="50000"/>
+                    <a:lumOff val="50000"/>
+                  </a:schemeClr>
+                </a:solidFill>
+              </a:rPr>
+              <a:t>, </a:t>
+            </a:r>
+            <a:r>
+              <a:rPr lang="ko-KR" altLang="en-US" sz="1000">
+                <a:solidFill>
+                  <a:schemeClr val="tx1">
+                    <a:lumMod val="50000"/>
+                    <a:lumOff val="50000"/>
+                  </a:schemeClr>
+                </a:solidFill>
+              </a:rPr>
+              <a:t>레이어 등등</a:t>
+            </a:r>
+            <a:r>
+              <a:rPr lang="en-US" altLang="ko-KR" sz="1000">
+                <a:solidFill>
+                  <a:schemeClr val="tx1">
+                    <a:lumMod val="50000"/>
+                    <a:lumOff val="50000"/>
+                  </a:schemeClr>
+                </a:solidFill>
+              </a:rPr>
+              <a:t>)</a:t>
+            </a:r>
+          </a:p>
+        </p:txBody>
+      </p:sp>
+      <p:sp>
+        <p:nvSpPr>
+          <p:cNvPr id="18" name="직사각형 17">
+            <a:extLst>
+              <a:ext uri="{FF2B5EF4-FFF2-40B4-BE49-F238E27FC236}">
+                <a16:creationId xmlns:a16="http://schemas.microsoft.com/office/drawing/2014/main" id="{8AA32219-8DDF-4E3A-AE06-5B4B2553DA1A}"/>
+              </a:ext>
+            </a:extLst>
+          </p:cNvPr>
+          <p:cNvSpPr/>
+          <p:nvPr/>
+        </p:nvSpPr>
+        <p:spPr>
+          <a:xfrm>
+            <a:off x="384635" y="2988278"/>
+            <a:ext cx="3727839" cy="246221"/>
+          </a:xfrm>
+          <a:prstGeom prst="rect">
+            <a:avLst/>
+          </a:prstGeom>
+        </p:spPr>
+        <p:txBody>
+          <a:bodyPr wrap="square">
+            <a:spAutoFit/>
+          </a:bodyPr>
+          <a:lstStyle/>
+          <a:p>
+            <a:pPr algn="ctr"/>
+            <a:r>
+              <a:rPr lang="en-US" altLang="ko-KR" sz="1000">
+                <a:solidFill>
+                  <a:schemeClr val="tx1">
+                    <a:lumMod val="50000"/>
+                    <a:lumOff val="50000"/>
+                  </a:schemeClr>
+                </a:solidFill>
+              </a:rPr>
+              <a:t>Resource Transitions</a:t>
+            </a:r>
+          </a:p>
+        </p:txBody>
+      </p:sp>
+      <p:sp>
+        <p:nvSpPr>
+          <p:cNvPr id="19" name="직사각형 18">
+            <a:extLst>
+              <a:ext uri="{FF2B5EF4-FFF2-40B4-BE49-F238E27FC236}">
+                <a16:creationId xmlns:a16="http://schemas.microsoft.com/office/drawing/2014/main" id="{E6F1D93C-A430-421D-85F7-BDAF80A153DB}"/>
+              </a:ext>
+            </a:extLst>
+          </p:cNvPr>
+          <p:cNvSpPr/>
+          <p:nvPr/>
+        </p:nvSpPr>
+        <p:spPr>
+          <a:xfrm>
+            <a:off x="44086" y="3566200"/>
+            <a:ext cx="4881782" cy="1477328"/>
+          </a:xfrm>
+          <a:prstGeom prst="rect">
+            <a:avLst/>
+          </a:prstGeom>
+        </p:spPr>
+        <p:txBody>
+          <a:bodyPr wrap="square">
+            <a:spAutoFit/>
+          </a:bodyPr>
+          <a:lstStyle/>
+          <a:p>
+            <a:pPr algn="ctr"/>
+            <a:r>
+              <a:rPr lang="en-US" altLang="ko-KR" sz="1000">
+                <a:solidFill>
+                  <a:schemeClr val="tx1">
+                    <a:lumMod val="50000"/>
+                    <a:lumOff val="50000"/>
+                  </a:schemeClr>
+                </a:solidFill>
+              </a:rPr>
+              <a:t>Image usage = layout</a:t>
+            </a:r>
+          </a:p>
+          <a:p>
+            <a:pPr algn="ctr"/>
+            <a:endParaRPr lang="en-US" altLang="ko-KR" sz="1000">
+              <a:solidFill>
+                <a:schemeClr val="tx1">
+                  <a:lumMod val="50000"/>
+                  <a:lumOff val="50000"/>
+                </a:schemeClr>
+              </a:solidFill>
+            </a:endParaRPr>
+          </a:p>
+          <a:p>
+            <a:pPr algn="ctr"/>
+            <a:r>
+              <a:rPr lang="en-US" altLang="ko-KR" sz="1000">
+                <a:solidFill>
+                  <a:schemeClr val="tx1">
+                    <a:lumMod val="50000"/>
+                    <a:lumOff val="50000"/>
+                  </a:schemeClr>
+                </a:solidFill>
+              </a:rPr>
+              <a:t>If usage need to change, it needs to shift to other layout</a:t>
+            </a:r>
+          </a:p>
+          <a:p>
+            <a:pPr algn="ctr"/>
+            <a:endParaRPr lang="en-US" altLang="ko-KR" sz="1000">
+              <a:solidFill>
+                <a:schemeClr val="tx1">
+                  <a:lumMod val="50000"/>
+                  <a:lumOff val="50000"/>
+                </a:schemeClr>
+              </a:solidFill>
+            </a:endParaRPr>
+          </a:p>
+          <a:p>
+            <a:pPr algn="ctr"/>
+            <a:r>
+              <a:rPr lang="en-US" altLang="ko-KR" sz="1000">
+                <a:solidFill>
+                  <a:schemeClr val="tx1">
+                    <a:lumMod val="50000"/>
+                    <a:lumOff val="50000"/>
+                  </a:schemeClr>
+                </a:solidFill>
+              </a:rPr>
+              <a:t>Default images are generally in undefined layout</a:t>
+            </a:r>
+          </a:p>
+          <a:p>
+            <a:pPr algn="ctr"/>
+            <a:r>
+              <a:rPr lang="en-US" altLang="ko-KR" sz="1000">
+                <a:solidFill>
+                  <a:schemeClr val="tx1">
+                    <a:lumMod val="50000"/>
+                    <a:lumOff val="50000"/>
+                  </a:schemeClr>
+                </a:solidFill>
+              </a:rPr>
+              <a:t>But swap-chain-created images have VK_IMAGE_LAYOUT_PRESENT_SOURCE_KHR layouts</a:t>
+            </a:r>
+          </a:p>
+          <a:p>
+            <a:pPr algn="ctr"/>
+            <a:endParaRPr lang="en-US" altLang="ko-KR" sz="1000">
+              <a:solidFill>
+                <a:schemeClr val="tx1">
+                  <a:lumMod val="50000"/>
+                  <a:lumOff val="50000"/>
+                </a:schemeClr>
+              </a:solidFill>
+            </a:endParaRPr>
+          </a:p>
+          <a:p>
+            <a:pPr algn="ctr"/>
+            <a:r>
+              <a:rPr lang="en-US" altLang="ko-KR" sz="1000">
+                <a:solidFill>
+                  <a:schemeClr val="tx1">
+                    <a:lumMod val="50000"/>
+                    <a:lumOff val="50000"/>
+                  </a:schemeClr>
+                </a:solidFill>
+              </a:rPr>
+              <a:t>To transit from one layout to other, image memory barriers are used</a:t>
+            </a:r>
+          </a:p>
+        </p:txBody>
+      </p:sp>
+      <p:sp>
+        <p:nvSpPr>
+          <p:cNvPr id="20" name="사각형: 둥근 모서리 19">
+            <a:extLst>
+              <a:ext uri="{FF2B5EF4-FFF2-40B4-BE49-F238E27FC236}">
+                <a16:creationId xmlns:a16="http://schemas.microsoft.com/office/drawing/2014/main" id="{478B8B9B-E42F-49C0-9E75-6DF54FD4A5E6}"/>
+              </a:ext>
+            </a:extLst>
+          </p:cNvPr>
+          <p:cNvSpPr/>
+          <p:nvPr/>
+        </p:nvSpPr>
+        <p:spPr>
+          <a:xfrm>
+            <a:off x="5991608" y="4086880"/>
+            <a:ext cx="783901" cy="322255"/>
+          </a:xfrm>
+          <a:prstGeom prst="roundRect">
+            <a:avLst>
+              <a:gd name="adj" fmla="val 13668"/>
+            </a:avLst>
+          </a:prstGeom>
+          <a:solidFill>
+            <a:schemeClr val="accent6">
+              <a:lumMod val="50000"/>
+            </a:schemeClr>
+          </a:solidFill>
           <a:ln w="25400">
             <a:solidFill>
-              <a:schemeClr val="tx1">
-                <a:lumMod val="50000"/>
-                <a:lumOff val="50000"/>
+              <a:schemeClr val="accent6">
+                <a:lumMod val="20000"/>
+                <a:lumOff val="80000"/>
               </a:schemeClr>
             </a:solidFill>
-            <a:tailEnd type="triangle"/>
+            <a:prstDash val="solid"/>
           </a:ln>
         </p:spPr>
         <p:style>
-          <a:lnRef idx="1">
-            <a:schemeClr val="accent1"/>
+          <a:lnRef idx="2">
+            <a:schemeClr val="accent1">
+              <a:shade val="50000"/>
+            </a:schemeClr>
           </a:lnRef>
-          <a:fillRef idx="0">
+          <a:fillRef idx="1">
             <a:schemeClr val="accent1"/>
           </a:fillRef>
           <a:effectRef idx="0">
             <a:schemeClr val="accent1"/>
           </a:effectRef>
           <a:fontRef idx="minor">
-            <a:schemeClr val="tx1"/>
+            <a:schemeClr val="lt1"/>
           </a:fontRef>
         </p:style>
-      </p:cxnSp>
-      <p:cxnSp>
-        <p:nvCxnSpPr>
-          <p:cNvPr id="33" name="직선 화살표 연결선 32">
-            <a:extLst>
-              <a:ext uri="{FF2B5EF4-FFF2-40B4-BE49-F238E27FC236}">
-                <a16:creationId xmlns:a16="http://schemas.microsoft.com/office/drawing/2014/main" id="{8937BAE7-CF2A-424B-90EA-D5303D49543E}"/>
-              </a:ext>
-            </a:extLst>
-          </p:cNvPr>
-          <p:cNvCxnSpPr>
-            <a:cxnSpLocks/>
-            <a:stCxn id="24" idx="3"/>
-            <a:endCxn id="25" idx="1"/>
-          </p:cNvCxnSpPr>
-          <p:nvPr/>
-        </p:nvCxnSpPr>
-        <p:spPr>
-          <a:xfrm>
-            <a:off x="5340058" y="3428999"/>
-            <a:ext cx="1596371" cy="1"/>
-          </a:xfrm>
-          <a:prstGeom prst="straightConnector1">
-            <a:avLst/>
-          </a:prstGeom>
+        <p:txBody>
+          <a:bodyPr rtlCol="0" anchor="ctr"/>
+          <a:lstStyle/>
+          <a:p>
+            <a:pPr algn="ctr"/>
+            <a:r>
+              <a:rPr lang="en-US" altLang="ko-KR" sz="1100">
+                <a:solidFill>
+                  <a:schemeClr val="accent6">
+                    <a:lumMod val="20000"/>
+                    <a:lumOff val="80000"/>
+                  </a:schemeClr>
+                </a:solidFill>
+              </a:rPr>
+              <a:t>Present</a:t>
+            </a:r>
+            <a:endParaRPr lang="ko-KR" altLang="en-US" sz="1100">
+              <a:solidFill>
+                <a:schemeClr val="accent6">
+                  <a:lumMod val="20000"/>
+                  <a:lumOff val="80000"/>
+                </a:schemeClr>
+              </a:solidFill>
+            </a:endParaRPr>
+          </a:p>
+        </p:txBody>
+      </p:sp>
+      <p:sp>
+        <p:nvSpPr>
+          <p:cNvPr id="21" name="사각형: 둥근 모서리 20">
+            <a:extLst>
+              <a:ext uri="{FF2B5EF4-FFF2-40B4-BE49-F238E27FC236}">
+                <a16:creationId xmlns:a16="http://schemas.microsoft.com/office/drawing/2014/main" id="{4B4B7222-E065-4953-A03B-9338FE58D35E}"/>
+              </a:ext>
+            </a:extLst>
+          </p:cNvPr>
+          <p:cNvSpPr/>
+          <p:nvPr/>
+        </p:nvSpPr>
+        <p:spPr>
+          <a:xfrm>
+            <a:off x="7866679" y="4090354"/>
+            <a:ext cx="783901" cy="322255"/>
+          </a:xfrm>
+          <a:prstGeom prst="roundRect">
+            <a:avLst>
+              <a:gd name="adj" fmla="val 13668"/>
+            </a:avLst>
+          </a:prstGeom>
+          <a:solidFill>
+            <a:schemeClr val="accent6">
+              <a:lumMod val="50000"/>
+            </a:schemeClr>
+          </a:solidFill>
           <a:ln w="25400">
             <a:solidFill>
-              <a:schemeClr val="tx1">
-                <a:lumMod val="50000"/>
-                <a:lumOff val="50000"/>
+              <a:schemeClr val="accent6">
+                <a:lumMod val="20000"/>
+                <a:lumOff val="80000"/>
               </a:schemeClr>
             </a:solidFill>
-            <a:tailEnd type="triangle"/>
+            <a:prstDash val="solid"/>
           </a:ln>
         </p:spPr>
         <p:style>
-          <a:lnRef idx="1">
-            <a:schemeClr val="accent1"/>
+          <a:lnRef idx="2">
+            <a:schemeClr val="accent1">
+              <a:shade val="50000"/>
+            </a:schemeClr>
           </a:lnRef>
-          <a:fillRef idx="0">
+          <a:fillRef idx="1">
             <a:schemeClr val="accent1"/>
           </a:fillRef>
           <a:effectRef idx="0">
             <a:schemeClr val="accent1"/>
           </a:effectRef>
           <a:fontRef idx="minor">
-            <a:schemeClr val="tx1"/>
+            <a:schemeClr val="lt1"/>
           </a:fontRef>
         </p:style>
-      </p:cxnSp>
+        <p:txBody>
+          <a:bodyPr rtlCol="0" anchor="ctr"/>
+          <a:lstStyle/>
+          <a:p>
+            <a:pPr algn="ctr"/>
+            <a:r>
+              <a:rPr lang="en-US" altLang="ko-KR" sz="1100">
+                <a:solidFill>
+                  <a:schemeClr val="accent6">
+                    <a:lumMod val="20000"/>
+                    <a:lumOff val="80000"/>
+                  </a:schemeClr>
+                </a:solidFill>
+              </a:rPr>
+              <a:t>Clear</a:t>
+            </a:r>
+            <a:endParaRPr lang="ko-KR" altLang="en-US" sz="1100">
+              <a:solidFill>
+                <a:schemeClr val="accent6">
+                  <a:lumMod val="20000"/>
+                  <a:lumOff val="80000"/>
+                </a:schemeClr>
+              </a:solidFill>
+            </a:endParaRPr>
+          </a:p>
+        </p:txBody>
+      </p:sp>
+      <p:sp>
+        <p:nvSpPr>
+          <p:cNvPr id="22" name="사각형: 둥근 모서리 21">
+            <a:extLst>
+              <a:ext uri="{FF2B5EF4-FFF2-40B4-BE49-F238E27FC236}">
+                <a16:creationId xmlns:a16="http://schemas.microsoft.com/office/drawing/2014/main" id="{B83376BA-223F-423A-9F99-45C32537DA2A}"/>
+              </a:ext>
+            </a:extLst>
+          </p:cNvPr>
+          <p:cNvSpPr/>
+          <p:nvPr/>
+        </p:nvSpPr>
+        <p:spPr>
+          <a:xfrm>
+            <a:off x="9716320" y="4090354"/>
+            <a:ext cx="783901" cy="322255"/>
+          </a:xfrm>
+          <a:prstGeom prst="roundRect">
+            <a:avLst>
+              <a:gd name="adj" fmla="val 13668"/>
+            </a:avLst>
+          </a:prstGeom>
+          <a:solidFill>
+            <a:schemeClr val="accent6">
+              <a:lumMod val="50000"/>
+            </a:schemeClr>
+          </a:solidFill>
+          <a:ln w="25400">
+            <a:solidFill>
+              <a:schemeClr val="accent6">
+                <a:lumMod val="20000"/>
+                <a:lumOff val="80000"/>
+              </a:schemeClr>
+            </a:solidFill>
+            <a:prstDash val="solid"/>
+          </a:ln>
+        </p:spPr>
+        <p:style>
+          <a:lnRef idx="2">
+            <a:schemeClr val="accent1">
+              <a:shade val="50000"/>
+            </a:schemeClr>
+          </a:lnRef>
+          <a:fillRef idx="1">
+            <a:schemeClr val="accent1"/>
+          </a:fillRef>
+          <a:effectRef idx="0">
+            <a:schemeClr val="accent1"/>
+          </a:effectRef>
+          <a:fontRef idx="minor">
+            <a:schemeClr val="lt1"/>
+          </a:fontRef>
+        </p:style>
+        <p:txBody>
+          <a:bodyPr rtlCol="0" anchor="ctr"/>
+          <a:lstStyle/>
+          <a:p>
+            <a:pPr algn="ctr"/>
+            <a:r>
+              <a:rPr lang="en-US" altLang="ko-KR" sz="1100">
+                <a:solidFill>
+                  <a:schemeClr val="accent6">
+                    <a:lumMod val="20000"/>
+                    <a:lumOff val="80000"/>
+                  </a:schemeClr>
+                </a:solidFill>
+              </a:rPr>
+              <a:t>Present</a:t>
+            </a:r>
+            <a:endParaRPr lang="ko-KR" altLang="en-US" sz="1100">
+              <a:solidFill>
+                <a:schemeClr val="accent6">
+                  <a:lumMod val="20000"/>
+                  <a:lumOff val="80000"/>
+                </a:schemeClr>
+              </a:solidFill>
+            </a:endParaRPr>
+          </a:p>
+        </p:txBody>
+      </p:sp>
     </p:spTree>
     <p:extLst>
       <p:ext uri="{BB962C8B-B14F-4D97-AF65-F5344CB8AC3E}">
-        <p14:creationId xmlns:p14="http://schemas.microsoft.com/office/powerpoint/2010/main" val="3053498206"/>
+        <p14:creationId xmlns:p14="http://schemas.microsoft.com/office/powerpoint/2010/main" val="1877049561"/>
       </p:ext>
     </p:extLst>
   </p:cSld>

</xml_diff>

<commit_message>
fixed clear & terminate & onwindowsizechanged mismatch. working on shader module.
</commit_message>
<xml_diff>
--- a/vulkan.pptx
+++ b/vulkan.pptx
@@ -12,7 +12,8 @@
     <p:sldId id="261" r:id="rId6"/>
     <p:sldId id="262" r:id="rId7"/>
     <p:sldId id="265" r:id="rId8"/>
-    <p:sldId id="264" r:id="rId9"/>
+    <p:sldId id="266" r:id="rId9"/>
+    <p:sldId id="264" r:id="rId10"/>
   </p:sldIdLst>
   <p:sldSz cx="12192000" cy="6858000"/>
   <p:notesSz cx="6858000" cy="9144000"/>
@@ -266,7 +267,7 @@
           <a:p>
             <a:fld id="{C70F4A24-0500-4741-BCE2-9D99BEF0B64A}" type="datetimeFigureOut">
               <a:rPr lang="ko-KR" altLang="en-US" smtClean="0"/>
-              <a:t>2019-09-28</a:t>
+              <a:t>2019-09-29</a:t>
             </a:fld>
             <a:endParaRPr lang="ko-KR" altLang="en-US"/>
           </a:p>
@@ -464,7 +465,7 @@
           <a:p>
             <a:fld id="{C70F4A24-0500-4741-BCE2-9D99BEF0B64A}" type="datetimeFigureOut">
               <a:rPr lang="ko-KR" altLang="en-US" smtClean="0"/>
-              <a:t>2019-09-28</a:t>
+              <a:t>2019-09-29</a:t>
             </a:fld>
             <a:endParaRPr lang="ko-KR" altLang="en-US"/>
           </a:p>
@@ -672,7 +673,7 @@
           <a:p>
             <a:fld id="{C70F4A24-0500-4741-BCE2-9D99BEF0B64A}" type="datetimeFigureOut">
               <a:rPr lang="ko-KR" altLang="en-US" smtClean="0"/>
-              <a:t>2019-09-28</a:t>
+              <a:t>2019-09-29</a:t>
             </a:fld>
             <a:endParaRPr lang="ko-KR" altLang="en-US"/>
           </a:p>
@@ -870,7 +871,7 @@
           <a:p>
             <a:fld id="{C70F4A24-0500-4741-BCE2-9D99BEF0B64A}" type="datetimeFigureOut">
               <a:rPr lang="ko-KR" altLang="en-US" smtClean="0"/>
-              <a:t>2019-09-28</a:t>
+              <a:t>2019-09-29</a:t>
             </a:fld>
             <a:endParaRPr lang="ko-KR" altLang="en-US"/>
           </a:p>
@@ -1145,7 +1146,7 @@
           <a:p>
             <a:fld id="{C70F4A24-0500-4741-BCE2-9D99BEF0B64A}" type="datetimeFigureOut">
               <a:rPr lang="ko-KR" altLang="en-US" smtClean="0"/>
-              <a:t>2019-09-28</a:t>
+              <a:t>2019-09-29</a:t>
             </a:fld>
             <a:endParaRPr lang="ko-KR" altLang="en-US"/>
           </a:p>
@@ -1410,7 +1411,7 @@
           <a:p>
             <a:fld id="{C70F4A24-0500-4741-BCE2-9D99BEF0B64A}" type="datetimeFigureOut">
               <a:rPr lang="ko-KR" altLang="en-US" smtClean="0"/>
-              <a:t>2019-09-28</a:t>
+              <a:t>2019-09-29</a:t>
             </a:fld>
             <a:endParaRPr lang="ko-KR" altLang="en-US"/>
           </a:p>
@@ -1822,7 +1823,7 @@
           <a:p>
             <a:fld id="{C70F4A24-0500-4741-BCE2-9D99BEF0B64A}" type="datetimeFigureOut">
               <a:rPr lang="ko-KR" altLang="en-US" smtClean="0"/>
-              <a:t>2019-09-28</a:t>
+              <a:t>2019-09-29</a:t>
             </a:fld>
             <a:endParaRPr lang="ko-KR" altLang="en-US"/>
           </a:p>
@@ -1963,7 +1964,7 @@
           <a:p>
             <a:fld id="{C70F4A24-0500-4741-BCE2-9D99BEF0B64A}" type="datetimeFigureOut">
               <a:rPr lang="ko-KR" altLang="en-US" smtClean="0"/>
-              <a:t>2019-09-28</a:t>
+              <a:t>2019-09-29</a:t>
             </a:fld>
             <a:endParaRPr lang="ko-KR" altLang="en-US"/>
           </a:p>
@@ -2076,7 +2077,7 @@
           <a:p>
             <a:fld id="{C70F4A24-0500-4741-BCE2-9D99BEF0B64A}" type="datetimeFigureOut">
               <a:rPr lang="ko-KR" altLang="en-US" smtClean="0"/>
-              <a:t>2019-09-28</a:t>
+              <a:t>2019-09-29</a:t>
             </a:fld>
             <a:endParaRPr lang="ko-KR" altLang="en-US"/>
           </a:p>
@@ -2387,7 +2388,7 @@
           <a:p>
             <a:fld id="{C70F4A24-0500-4741-BCE2-9D99BEF0B64A}" type="datetimeFigureOut">
               <a:rPr lang="ko-KR" altLang="en-US" smtClean="0"/>
-              <a:t>2019-09-28</a:t>
+              <a:t>2019-09-29</a:t>
             </a:fld>
             <a:endParaRPr lang="ko-KR" altLang="en-US"/>
           </a:p>
@@ -2675,7 +2676,7 @@
           <a:p>
             <a:fld id="{C70F4A24-0500-4741-BCE2-9D99BEF0B64A}" type="datetimeFigureOut">
               <a:rPr lang="ko-KR" altLang="en-US" smtClean="0"/>
-              <a:t>2019-09-28</a:t>
+              <a:t>2019-09-29</a:t>
             </a:fld>
             <a:endParaRPr lang="ko-KR" altLang="en-US"/>
           </a:p>
@@ -2916,7 +2917,7 @@
           <a:p>
             <a:fld id="{C70F4A24-0500-4741-BCE2-9D99BEF0B64A}" type="datetimeFigureOut">
               <a:rPr lang="ko-KR" altLang="en-US" smtClean="0"/>
-              <a:t>2019-09-28</a:t>
+              <a:t>2019-09-29</a:t>
             </a:fld>
             <a:endParaRPr lang="ko-KR" altLang="en-US"/>
           </a:p>
@@ -14565,7 +14566,7 @@
           <a:p>
             <a:pPr algn="ctr"/>
             <a:r>
-              <a:rPr lang="en-US" altLang="ko-KR" sz="1000">
+              <a:rPr lang="en-US" altLang="ko-KR" sz="1000" dirty="0">
                 <a:solidFill>
                   <a:schemeClr val="tx1">
                     <a:lumMod val="50000"/>
@@ -14573,7 +14574,51 @@
                   </a:schemeClr>
                 </a:solidFill>
               </a:rPr>
-              <a:t>* RenderPass and SubPass have their own attachments.</a:t>
+              <a:t>* </a:t>
+            </a:r>
+            <a:r>
+              <a:rPr lang="en-US" altLang="ko-KR" sz="1000" dirty="0" err="1">
+                <a:solidFill>
+                  <a:schemeClr val="tx1">
+                    <a:lumMod val="50000"/>
+                    <a:lumOff val="50000"/>
+                  </a:schemeClr>
+                </a:solidFill>
+              </a:rPr>
+              <a:t>RenderPass</a:t>
+            </a:r>
+            <a:r>
+              <a:rPr lang="en-US" altLang="ko-KR" sz="1000" dirty="0">
+                <a:solidFill>
+                  <a:schemeClr val="tx1">
+                    <a:lumMod val="50000"/>
+                    <a:lumOff val="50000"/>
+                  </a:schemeClr>
+                </a:solidFill>
+              </a:rPr>
+              <a:t> and </a:t>
+            </a:r>
+            <a:r>
+              <a:rPr lang="en-US" altLang="ko-KR" sz="1000" dirty="0" err="1">
+                <a:solidFill>
+                  <a:schemeClr val="tx1">
+                    <a:lumMod val="50000"/>
+                    <a:lumOff val="50000"/>
+                  </a:schemeClr>
+                </a:solidFill>
+              </a:rPr>
+              <a:t>SubPass</a:t>
+            </a:r>
+            <a:r>
+              <a:rPr lang="en-US" altLang="ko-KR" sz="1000" dirty="0">
+                <a:solidFill>
+                  <a:schemeClr val="tx1">
+                    <a:lumMod val="50000"/>
+                    <a:lumOff val="50000"/>
+                  </a:schemeClr>
+                </a:solidFill>
+              </a:rPr>
+              <a:t> have their own attachments.</a:t>
             </a:r>
           </a:p>
         </p:txBody>
@@ -14754,6 +14799,62 @@
           </a:fontRef>
         </p:style>
       </p:cxnSp>
+      <p:sp>
+        <p:nvSpPr>
+          <p:cNvPr id="23" name="직사각형 22">
+            <a:extLst>
+              <a:ext uri="{FF2B5EF4-FFF2-40B4-BE49-F238E27FC236}">
+                <a16:creationId xmlns:a16="http://schemas.microsoft.com/office/drawing/2014/main" id="{B4CA3AE5-04DD-462F-9EC7-BA92EAE25D1F}"/>
+              </a:ext>
+            </a:extLst>
+          </p:cNvPr>
+          <p:cNvSpPr/>
+          <p:nvPr/>
+        </p:nvSpPr>
+        <p:spPr>
+          <a:xfrm>
+            <a:off x="194359" y="3566191"/>
+            <a:ext cx="2998362" cy="400110"/>
+          </a:xfrm>
+          <a:prstGeom prst="rect">
+            <a:avLst/>
+          </a:prstGeom>
+        </p:spPr>
+        <p:txBody>
+          <a:bodyPr wrap="square">
+            <a:spAutoFit/>
+          </a:bodyPr>
+          <a:lstStyle/>
+          <a:p>
+            <a:pPr algn="ctr"/>
+            <a:r>
+              <a:rPr lang="en-US" altLang="ko-KR" sz="1000" dirty="0">
+                <a:solidFill>
+                  <a:schemeClr val="tx1">
+                    <a:lumMod val="50000"/>
+                    <a:lumOff val="50000"/>
+                  </a:schemeClr>
+                </a:solidFill>
+              </a:rPr>
+              <a:t>*Framebuffer image count needs to</a:t>
+            </a:r>
+          </a:p>
+          <a:p>
+            <a:pPr algn="ctr"/>
+            <a:r>
+              <a:rPr lang="en-US" altLang="ko-KR" sz="1000" dirty="0">
+                <a:solidFill>
+                  <a:schemeClr val="tx1">
+                    <a:lumMod val="50000"/>
+                    <a:lumOff val="50000"/>
+                  </a:schemeClr>
+                </a:solidFill>
+              </a:rPr>
+              <a:t>match render pass attachment count</a:t>
+            </a:r>
+          </a:p>
+        </p:txBody>
+      </p:sp>
     </p:spTree>
     <p:extLst>
       <p:ext uri="{BB962C8B-B14F-4D97-AF65-F5344CB8AC3E}">
@@ -14768,6 +14869,215 @@
 </file>
 
 <file path=ppt/slides/slide8.xml><?xml version="1.0" encoding="utf-8"?>
+<p:sld xmlns:a="http://schemas.openxmlformats.org/drawingml/2006/main" xmlns:r="http://schemas.openxmlformats.org/officeDocument/2006/relationships" xmlns:p="http://schemas.openxmlformats.org/presentationml/2006/main">
+  <p:cSld>
+    <p:spTree>
+      <p:nvGrpSpPr>
+        <p:cNvPr id="1" name=""/>
+        <p:cNvGrpSpPr/>
+        <p:nvPr/>
+      </p:nvGrpSpPr>
+      <p:grpSpPr>
+        <a:xfrm>
+          <a:off x="0" y="0"/>
+          <a:ext cx="0" cy="0"/>
+          <a:chOff x="0" y="0"/>
+          <a:chExt cx="0" cy="0"/>
+        </a:xfrm>
+      </p:grpSpPr>
+      <p:sp>
+        <p:nvSpPr>
+          <p:cNvPr id="11" name="TextBox 10">
+            <a:extLst>
+              <a:ext uri="{FF2B5EF4-FFF2-40B4-BE49-F238E27FC236}">
+                <a16:creationId xmlns:a16="http://schemas.microsoft.com/office/drawing/2014/main" id="{81E0DA48-C29D-456A-BF5F-351008F24BBB}"/>
+              </a:ext>
+            </a:extLst>
+          </p:cNvPr>
+          <p:cNvSpPr txBox="1"/>
+          <p:nvPr/>
+        </p:nvSpPr>
+        <p:spPr>
+          <a:xfrm>
+            <a:off x="0" y="15118"/>
+            <a:ext cx="1348446" cy="461665"/>
+          </a:xfrm>
+          <a:prstGeom prst="rect">
+            <a:avLst/>
+          </a:prstGeom>
+          <a:noFill/>
+        </p:spPr>
+        <p:txBody>
+          <a:bodyPr wrap="none" rtlCol="0">
+            <a:spAutoFit/>
+          </a:bodyPr>
+          <a:lstStyle/>
+          <a:p>
+            <a:r>
+              <a:rPr lang="en-US" altLang="ko-KR" sz="2400" b="1" dirty="0">
+                <a:solidFill>
+                  <a:schemeClr val="tx1">
+                    <a:lumMod val="50000"/>
+                    <a:lumOff val="50000"/>
+                  </a:schemeClr>
+                </a:solidFill>
+              </a:rPr>
+              <a:t>Pipeline</a:t>
+            </a:r>
+            <a:endParaRPr lang="ko-KR" altLang="en-US" sz="2400" dirty="0">
+              <a:solidFill>
+                <a:schemeClr val="tx1">
+                  <a:lumMod val="50000"/>
+                  <a:lumOff val="50000"/>
+                </a:schemeClr>
+              </a:solidFill>
+            </a:endParaRPr>
+          </a:p>
+        </p:txBody>
+      </p:sp>
+      <p:sp>
+        <p:nvSpPr>
+          <p:cNvPr id="15" name="사각형: 둥근 모서리 14">
+            <a:extLst>
+              <a:ext uri="{FF2B5EF4-FFF2-40B4-BE49-F238E27FC236}">
+                <a16:creationId xmlns:a16="http://schemas.microsoft.com/office/drawing/2014/main" id="{A5A89842-6FCB-4E2B-935E-AA0839DB2591}"/>
+              </a:ext>
+            </a:extLst>
+          </p:cNvPr>
+          <p:cNvSpPr/>
+          <p:nvPr/>
+        </p:nvSpPr>
+        <p:spPr>
+          <a:xfrm>
+            <a:off x="2899957" y="1400774"/>
+            <a:ext cx="6392085" cy="4056452"/>
+          </a:xfrm>
+          <a:prstGeom prst="roundRect">
+            <a:avLst>
+              <a:gd name="adj" fmla="val 3568"/>
+            </a:avLst>
+          </a:prstGeom>
+          <a:solidFill>
+            <a:srgbClr val="E7FFF6"/>
+          </a:solidFill>
+          <a:ln w="19050">
+            <a:solidFill>
+              <a:srgbClr val="358374"/>
+            </a:solidFill>
+            <a:prstDash val="sysDash"/>
+          </a:ln>
+        </p:spPr>
+        <p:style>
+          <a:lnRef idx="2">
+            <a:schemeClr val="accent1">
+              <a:shade val="50000"/>
+            </a:schemeClr>
+          </a:lnRef>
+          <a:fillRef idx="1">
+            <a:schemeClr val="accent1"/>
+          </a:fillRef>
+          <a:effectRef idx="0">
+            <a:schemeClr val="accent1"/>
+          </a:effectRef>
+          <a:fontRef idx="minor">
+            <a:schemeClr val="lt1"/>
+          </a:fontRef>
+        </p:style>
+        <p:txBody>
+          <a:bodyPr rtlCol="0" anchor="b"/>
+          <a:lstStyle/>
+          <a:p>
+            <a:r>
+              <a:rPr lang="en-US" altLang="ko-KR" sz="1100" b="1" dirty="0">
+                <a:solidFill>
+                  <a:srgbClr val="358374"/>
+                </a:solidFill>
+              </a:rPr>
+              <a:t>Pipeline</a:t>
+            </a:r>
+            <a:endParaRPr lang="ko-KR" altLang="en-US" sz="1100" b="1" dirty="0">
+              <a:solidFill>
+                <a:srgbClr val="358374"/>
+              </a:solidFill>
+            </a:endParaRPr>
+          </a:p>
+        </p:txBody>
+      </p:sp>
+      <p:sp>
+        <p:nvSpPr>
+          <p:cNvPr id="24" name="직사각형 23">
+            <a:extLst>
+              <a:ext uri="{FF2B5EF4-FFF2-40B4-BE49-F238E27FC236}">
+                <a16:creationId xmlns:a16="http://schemas.microsoft.com/office/drawing/2014/main" id="{22B4DD67-C49B-44C5-AD44-E5EE849C7E08}"/>
+              </a:ext>
+            </a:extLst>
+          </p:cNvPr>
+          <p:cNvSpPr/>
+          <p:nvPr/>
+        </p:nvSpPr>
+        <p:spPr>
+          <a:xfrm>
+            <a:off x="3655108" y="5564138"/>
+            <a:ext cx="4881782" cy="400110"/>
+          </a:xfrm>
+          <a:prstGeom prst="rect">
+            <a:avLst/>
+          </a:prstGeom>
+        </p:spPr>
+        <p:txBody>
+          <a:bodyPr wrap="square">
+            <a:spAutoFit/>
+          </a:bodyPr>
+          <a:lstStyle/>
+          <a:p>
+            <a:pPr algn="ctr"/>
+            <a:r>
+              <a:rPr lang="en-US" altLang="ko-KR" sz="1000" dirty="0">
+                <a:solidFill>
+                  <a:schemeClr val="tx1">
+                    <a:lumMod val="50000"/>
+                    <a:lumOff val="50000"/>
+                  </a:schemeClr>
+                </a:solidFill>
+              </a:rPr>
+              <a:t>* Pipeline is immutable! If you want to change shader, you need to build Pipeline </a:t>
+            </a:r>
+            <a:r>
+              <a:rPr lang="en-US" altLang="ko-KR" sz="1000">
+                <a:solidFill>
+                  <a:schemeClr val="tx1">
+                    <a:lumMod val="50000"/>
+                    <a:lumOff val="50000"/>
+                  </a:schemeClr>
+                </a:solidFill>
+              </a:rPr>
+              <a:t>from beginning again</a:t>
+            </a:r>
+            <a:endParaRPr lang="en-US" altLang="ko-KR" sz="1000" dirty="0">
+              <a:solidFill>
+                <a:schemeClr val="tx1">
+                  <a:lumMod val="50000"/>
+                  <a:lumOff val="50000"/>
+                </a:schemeClr>
+              </a:solidFill>
+            </a:endParaRPr>
+          </a:p>
+        </p:txBody>
+      </p:sp>
+    </p:spTree>
+    <p:extLst>
+      <p:ext uri="{BB962C8B-B14F-4D97-AF65-F5344CB8AC3E}">
+        <p14:creationId xmlns:p14="http://schemas.microsoft.com/office/powerpoint/2010/main" val="1037462800"/>
+      </p:ext>
+    </p:extLst>
+  </p:cSld>
+  <p:clrMapOvr>
+    <a:masterClrMapping/>
+  </p:clrMapOvr>
+</p:sld>
+</file>
+
+<file path=ppt/slides/slide9.xml><?xml version="1.0" encoding="utf-8"?>
 <p:sld xmlns:a="http://schemas.openxmlformats.org/drawingml/2006/main" xmlns:r="http://schemas.openxmlformats.org/officeDocument/2006/relationships" xmlns:p="http://schemas.openxmlformats.org/presentationml/2006/main">
   <p:cSld>
     <p:spTree>

</xml_diff>